<commit_message>
finished first version of the slide for Rolfs talk
</commit_message>
<xml_diff>
--- a/rbc_bimsb/sab-berlin-2016/slide_for_Rolfs_talk.pptx
+++ b/rbc_bimsb/sab-berlin-2016/slide_for_Rolfs_talk.pptx
@@ -5,7 +5,7 @@
     <p:sldMasterId id="2147483648" r:id="rId1"/>
   </p:sldMasterIdLst>
   <p:sldIdLst>
-    <p:sldId id="257" r:id="rId2"/>
+    <p:sldId id="258" r:id="rId2"/>
   </p:sldIdLst>
   <p:sldSz cx="9144000" cy="6858000" type="screen4x3"/>
   <p:notesSz cx="6858000" cy="9144000"/>
@@ -288,7 +288,7 @@
           <a:p>
             <a:fld id="{2C234B5D-BC28-4B48-A123-68B5A667BDF7}" type="datetimeFigureOut">
               <a:rPr lang="de-DE" smtClean="0"/>
-              <a:t>16/11/16</a:t>
+              <a:t>17/11/16</a:t>
             </a:fld>
             <a:endParaRPr lang="de-DE"/>
           </a:p>
@@ -458,7 +458,7 @@
           <a:p>
             <a:fld id="{2C234B5D-BC28-4B48-A123-68B5A667BDF7}" type="datetimeFigureOut">
               <a:rPr lang="de-DE" smtClean="0"/>
-              <a:t>16/11/16</a:t>
+              <a:t>17/11/16</a:t>
             </a:fld>
             <a:endParaRPr lang="de-DE"/>
           </a:p>
@@ -638,7 +638,7 @@
           <a:p>
             <a:fld id="{2C234B5D-BC28-4B48-A123-68B5A667BDF7}" type="datetimeFigureOut">
               <a:rPr lang="de-DE" smtClean="0"/>
-              <a:t>16/11/16</a:t>
+              <a:t>17/11/16</a:t>
             </a:fld>
             <a:endParaRPr lang="de-DE"/>
           </a:p>
@@ -808,7 +808,7 @@
           <a:p>
             <a:fld id="{2C234B5D-BC28-4B48-A123-68B5A667BDF7}" type="datetimeFigureOut">
               <a:rPr lang="de-DE" smtClean="0"/>
-              <a:t>16/11/16</a:t>
+              <a:t>17/11/16</a:t>
             </a:fld>
             <a:endParaRPr lang="de-DE"/>
           </a:p>
@@ -1054,7 +1054,7 @@
           <a:p>
             <a:fld id="{2C234B5D-BC28-4B48-A123-68B5A667BDF7}" type="datetimeFigureOut">
               <a:rPr lang="de-DE" smtClean="0"/>
-              <a:t>16/11/16</a:t>
+              <a:t>17/11/16</a:t>
             </a:fld>
             <a:endParaRPr lang="de-DE"/>
           </a:p>
@@ -1342,7 +1342,7 @@
           <a:p>
             <a:fld id="{2C234B5D-BC28-4B48-A123-68B5A667BDF7}" type="datetimeFigureOut">
               <a:rPr lang="de-DE" smtClean="0"/>
-              <a:t>16/11/16</a:t>
+              <a:t>17/11/16</a:t>
             </a:fld>
             <a:endParaRPr lang="de-DE"/>
           </a:p>
@@ -1764,7 +1764,7 @@
           <a:p>
             <a:fld id="{2C234B5D-BC28-4B48-A123-68B5A667BDF7}" type="datetimeFigureOut">
               <a:rPr lang="de-DE" smtClean="0"/>
-              <a:t>16/11/16</a:t>
+              <a:t>17/11/16</a:t>
             </a:fld>
             <a:endParaRPr lang="de-DE"/>
           </a:p>
@@ -1882,7 +1882,7 @@
           <a:p>
             <a:fld id="{2C234B5D-BC28-4B48-A123-68B5A667BDF7}" type="datetimeFigureOut">
               <a:rPr lang="de-DE" smtClean="0"/>
-              <a:t>16/11/16</a:t>
+              <a:t>17/11/16</a:t>
             </a:fld>
             <a:endParaRPr lang="de-DE"/>
           </a:p>
@@ -1977,7 +1977,7 @@
           <a:p>
             <a:fld id="{2C234B5D-BC28-4B48-A123-68B5A667BDF7}" type="datetimeFigureOut">
               <a:rPr lang="de-DE" smtClean="0"/>
-              <a:t>16/11/16</a:t>
+              <a:t>17/11/16</a:t>
             </a:fld>
             <a:endParaRPr lang="de-DE"/>
           </a:p>
@@ -2254,7 +2254,7 @@
           <a:p>
             <a:fld id="{2C234B5D-BC28-4B48-A123-68B5A667BDF7}" type="datetimeFigureOut">
               <a:rPr lang="de-DE" smtClean="0"/>
-              <a:t>16/11/16</a:t>
+              <a:t>17/11/16</a:t>
             </a:fld>
             <a:endParaRPr lang="de-DE"/>
           </a:p>
@@ -2507,7 +2507,7 @@
           <a:p>
             <a:fld id="{2C234B5D-BC28-4B48-A123-68B5A667BDF7}" type="datetimeFigureOut">
               <a:rPr lang="de-DE" smtClean="0"/>
-              <a:t>16/11/16</a:t>
+              <a:t>17/11/16</a:t>
             </a:fld>
             <a:endParaRPr lang="de-DE"/>
           </a:p>
@@ -2720,7 +2720,7 @@
           <a:p>
             <a:fld id="{2C234B5D-BC28-4B48-A123-68B5A667BDF7}" type="datetimeFigureOut">
               <a:rPr lang="de-DE" smtClean="0"/>
-              <a:t>16/11/16</a:t>
+              <a:t>17/11/16</a:t>
             </a:fld>
             <a:endParaRPr lang="de-DE"/>
           </a:p>
@@ -3095,45 +3095,9 @@
           <a:chExt cx="0" cy="0"/>
         </a:xfrm>
       </p:grpSpPr>
-      <p:sp>
-        <p:nvSpPr>
-          <p:cNvPr id="2" name="Titel 1"/>
-          <p:cNvSpPr>
-            <a:spLocks noGrp="1"/>
-          </p:cNvSpPr>
-          <p:nvPr>
-            <p:ph type="title"/>
-          </p:nvPr>
-        </p:nvSpPr>
-        <p:spPr>
-          <a:xfrm>
-            <a:off x="457200" y="274638"/>
-            <a:ext cx="4826000" cy="1143000"/>
-          </a:xfrm>
-        </p:spPr>
-        <p:txBody>
-          <a:bodyPr>
-            <a:normAutofit/>
-          </a:bodyPr>
-          <a:lstStyle/>
-          <a:p>
-            <a:r>
-              <a:rPr lang="en-US" sz="2400" dirty="0"/>
-              <a:t>RBC 3&amp;4 – For RNA-binding proteins and post-transcriptional regulation</a:t>
-            </a:r>
-            <a:r>
-              <a:rPr lang="en-US" sz="2400" dirty="0" smtClean="0">
-                <a:effectLst/>
-              </a:rPr>
-              <a:t> </a:t>
-            </a:r>
-            <a:endParaRPr lang="de-DE" sz="2400" dirty="0"/>
-          </a:p>
-        </p:txBody>
-      </p:sp>
       <p:pic>
         <p:nvPicPr>
-          <p:cNvPr id="5" name="Bild 4" descr="logo_28185.png"/>
+          <p:cNvPr id="55" name="Bild 54" descr="GalaxyUserCount.png"/>
           <p:cNvPicPr>
             <a:picLocks noChangeAspect="1"/>
           </p:cNvPicPr>
@@ -3153,7 +3117,73 @@
         </p:blipFill>
         <p:spPr>
           <a:xfrm>
-            <a:off x="5702176" y="363351"/>
+            <a:off x="33012" y="4204403"/>
+            <a:ext cx="3253463" cy="2554762"/>
+          </a:xfrm>
+          <a:prstGeom prst="rect">
+            <a:avLst/>
+          </a:prstGeom>
+        </p:spPr>
+      </p:pic>
+      <p:sp>
+        <p:nvSpPr>
+          <p:cNvPr id="8" name="Titel 1"/>
+          <p:cNvSpPr>
+            <a:spLocks noGrp="1"/>
+          </p:cNvSpPr>
+          <p:nvPr>
+            <p:ph type="title"/>
+          </p:nvPr>
+        </p:nvSpPr>
+        <p:spPr>
+          <a:xfrm>
+            <a:off x="457200" y="34444"/>
+            <a:ext cx="4826000" cy="1143000"/>
+          </a:xfrm>
+        </p:spPr>
+        <p:txBody>
+          <a:bodyPr>
+            <a:normAutofit/>
+          </a:bodyPr>
+          <a:lstStyle/>
+          <a:p>
+            <a:r>
+              <a:rPr lang="en-US" sz="2400" dirty="0"/>
+              <a:t>RBC 3&amp;4 – For RNA-binding proteins and post-transcriptional regulation</a:t>
+            </a:r>
+            <a:r>
+              <a:rPr lang="en-US" sz="2400" dirty="0" smtClean="0">
+                <a:effectLst/>
+              </a:rPr>
+              <a:t> </a:t>
+            </a:r>
+            <a:endParaRPr lang="de-DE" sz="2400" dirty="0"/>
+          </a:p>
+        </p:txBody>
+      </p:sp>
+      <p:pic>
+        <p:nvPicPr>
+          <p:cNvPr id="9" name="Bild 8" descr="logo_28185.png"/>
+          <p:cNvPicPr>
+            <a:picLocks noChangeAspect="1"/>
+          </p:cNvPicPr>
+          <p:nvPr/>
+        </p:nvPicPr>
+        <p:blipFill>
+          <a:blip r:embed="rId3">
+            <a:extLst>
+              <a:ext uri="{28A0092B-C50C-407E-A947-70E740481C1C}">
+                <a14:useLocalDpi xmlns:a14="http://schemas.microsoft.com/office/drawing/2010/main" val="0"/>
+              </a:ext>
+            </a:extLst>
+          </a:blip>
+          <a:stretch>
+            <a:fillRect/>
+          </a:stretch>
+        </p:blipFill>
+        <p:spPr>
+          <a:xfrm>
+            <a:off x="5702176" y="114516"/>
             <a:ext cx="2903757" cy="1054287"/>
           </a:xfrm>
           <a:prstGeom prst="rect">
@@ -3161,468 +3191,527 @@
           </a:prstGeom>
         </p:spPr>
       </p:pic>
-      <p:grpSp>
-        <p:nvGrpSpPr>
-          <p:cNvPr id="6" name="Gruppierung 5"/>
-          <p:cNvGrpSpPr/>
+      <p:cxnSp>
+        <p:nvCxnSpPr>
+          <p:cNvPr id="23" name="Gerade Verbindung 22"/>
+          <p:cNvCxnSpPr>
+            <a:stCxn id="31" idx="0"/>
+            <a:endCxn id="51" idx="2"/>
+          </p:cNvCxnSpPr>
           <p:nvPr/>
-        </p:nvGrpSpPr>
-        <p:grpSpPr>
+        </p:nvCxnSpPr>
+        <p:spPr>
           <a:xfrm>
-            <a:off x="5507567" y="1623755"/>
-            <a:ext cx="2971800" cy="2868929"/>
-            <a:chOff x="-14605" y="14287"/>
-            <a:chExt cx="2971800" cy="2854643"/>
+            <a:off x="4552156" y="1278502"/>
+            <a:ext cx="0" cy="5517289"/>
           </a:xfrm>
-        </p:grpSpPr>
-        <p:sp>
-          <p:nvSpPr>
-            <p:cNvPr id="7" name="Textfeld 6"/>
-            <p:cNvSpPr txBox="1"/>
-            <p:nvPr/>
-          </p:nvSpPr>
-          <p:spPr>
-            <a:xfrm>
-              <a:off x="-14605" y="2104390"/>
-              <a:ext cx="2971800" cy="764540"/>
-            </a:xfrm>
-            <a:prstGeom prst="rect">
-              <a:avLst/>
-            </a:prstGeom>
-            <a:noFill/>
-            <a:ln>
-              <a:noFill/>
-            </a:ln>
-            <a:effectLst/>
+          <a:prstGeom prst="line">
+            <a:avLst/>
+          </a:prstGeom>
+          <a:ln>
+            <a:solidFill>
+              <a:schemeClr val="tx1"/>
+            </a:solidFill>
+          </a:ln>
+        </p:spPr>
+        <p:style>
+          <a:lnRef idx="2">
+            <a:schemeClr val="accent1"/>
+          </a:lnRef>
+          <a:fillRef idx="0">
+            <a:schemeClr val="accent1"/>
+          </a:fillRef>
+          <a:effectRef idx="1">
+            <a:schemeClr val="accent1"/>
+          </a:effectRef>
+          <a:fontRef idx="minor">
+            <a:schemeClr val="tx1"/>
+          </a:fontRef>
+        </p:style>
+      </p:cxnSp>
+      <p:pic>
+        <p:nvPicPr>
+          <p:cNvPr id="24" name="Bild 23" descr="IMG_2608.JPG"/>
+          <p:cNvPicPr>
+            <a:picLocks noChangeAspect="1"/>
+          </p:cNvPicPr>
+          <p:nvPr/>
+        </p:nvPicPr>
+        <p:blipFill>
+          <a:blip r:embed="rId4">
             <a:extLst>
-              <a:ext uri="{C572A759-6A51-4108-AA02-DFA0A04FC94B}">
-                <ma14:wrappingTextBoxFlag xmlns:ma14="http://schemas.microsoft.com/office/mac/drawingml/2011/main"/>
+              <a:ext uri="{28A0092B-C50C-407E-A947-70E740481C1C}">
+                <a14:useLocalDpi xmlns:a14="http://schemas.microsoft.com/office/drawing/2010/main" val="0"/>
               </a:ext>
             </a:extLst>
-          </p:spPr>
-          <p:style>
-            <a:lnRef idx="0">
-              <a:schemeClr val="accent1"/>
-            </a:lnRef>
-            <a:fillRef idx="0">
-              <a:schemeClr val="accent1"/>
-            </a:fillRef>
-            <a:effectRef idx="0">
-              <a:schemeClr val="accent1"/>
-            </a:effectRef>
-            <a:fontRef idx="minor">
-              <a:schemeClr val="dk1"/>
-            </a:fontRef>
-          </p:style>
-          <p:txBody>
-            <a:bodyPr rot="0" spcFirstLastPara="0" vert="horz" wrap="square" lIns="91440" tIns="45720" rIns="91440" bIns="45720" numCol="1" spcCol="0" rtlCol="0" fromWordArt="0" anchor="t" anchorCtr="0" forceAA="0" compatLnSpc="1">
-              <a:prstTxWarp prst="textNoShape">
-                <a:avLst/>
-              </a:prstTxWarp>
-              <a:noAutofit/>
-            </a:bodyPr>
-            <a:lstStyle/>
-            <a:p>
-              <a:pPr algn="just">
-                <a:spcAft>
-                  <a:spcPts val="0"/>
-                </a:spcAft>
-              </a:pPr>
-              <a:r>
-                <a:rPr lang="en-US" sz="1050" dirty="0" err="1">
-                  <a:effectLst/>
-                  <a:latin typeface="Cambria"/>
-                  <a:ea typeface="Calibri"/>
-                  <a:cs typeface="Times New Roman"/>
-                </a:rPr>
-                <a:t>DoRiNA</a:t>
-              </a:r>
-              <a:r>
-                <a:rPr lang="en-US" sz="1050" dirty="0">
-                  <a:effectLst/>
-                  <a:latin typeface="Cambria"/>
-                  <a:ea typeface="Calibri"/>
-                  <a:cs typeface="Times New Roman"/>
-                </a:rPr>
-                <a:t> integrates experimental and computational datasets for RBP and </a:t>
-              </a:r>
-              <a:r>
-                <a:rPr lang="en-US" sz="1050" dirty="0" err="1">
-                  <a:effectLst/>
-                  <a:latin typeface="Cambria"/>
-                  <a:ea typeface="Calibri"/>
-                  <a:cs typeface="Times New Roman"/>
-                </a:rPr>
-                <a:t>miRNA</a:t>
-              </a:r>
-              <a:r>
-                <a:rPr lang="en-US" sz="1050" dirty="0">
-                  <a:effectLst/>
-                  <a:latin typeface="Cambria"/>
-                  <a:ea typeface="Calibri"/>
-                  <a:cs typeface="Times New Roman"/>
-                </a:rPr>
-                <a:t> binding sites.  (</a:t>
-              </a:r>
-              <a:r>
-                <a:rPr lang="en-US" sz="1050" dirty="0" err="1">
-                  <a:effectLst/>
-                  <a:latin typeface="Cambria"/>
-                  <a:ea typeface="Calibri"/>
-                  <a:cs typeface="Times New Roman"/>
-                </a:rPr>
-                <a:t>Blin</a:t>
-              </a:r>
-              <a:r>
-                <a:rPr lang="en-US" sz="1050" dirty="0">
-                  <a:effectLst/>
-                  <a:latin typeface="Cambria"/>
-                  <a:ea typeface="Calibri"/>
-                  <a:cs typeface="Times New Roman"/>
-                </a:rPr>
-                <a:t> </a:t>
-              </a:r>
-              <a:r>
-                <a:rPr lang="en-US" sz="1050" i="1" dirty="0">
-                  <a:effectLst/>
-                  <a:latin typeface="Cambria"/>
-                  <a:ea typeface="Calibri"/>
-                  <a:cs typeface="Times New Roman"/>
-                </a:rPr>
-                <a:t>et al. </a:t>
-              </a:r>
-              <a:r>
-                <a:rPr lang="en-US" sz="1050" dirty="0">
-                  <a:effectLst/>
-                  <a:latin typeface="Cambria"/>
-                  <a:ea typeface="Calibri"/>
-                  <a:cs typeface="Times New Roman"/>
-                </a:rPr>
-                <a:t>NAR 2015)</a:t>
-              </a:r>
-              <a:endParaRPr lang="en-US" sz="1200" dirty="0">
-                <a:effectLst/>
-                <a:ea typeface="Calibri"/>
-                <a:cs typeface="Times New Roman"/>
-              </a:endParaRPr>
-            </a:p>
-          </p:txBody>
-        </p:sp>
-        <p:pic>
-          <p:nvPicPr>
-            <p:cNvPr id="8" name="Bild 7"/>
-            <p:cNvPicPr>
-              <a:picLocks noChangeAspect="1"/>
-            </p:cNvPicPr>
-            <p:nvPr/>
-          </p:nvPicPr>
-          <p:blipFill>
-            <a:blip r:embed="rId3">
-              <a:extLst>
-                <a:ext uri="{28A0092B-C50C-407E-A947-70E740481C1C}">
-                  <a14:useLocalDpi xmlns:a14="http://schemas.microsoft.com/office/drawing/2010/main" val="0"/>
-                </a:ext>
-              </a:extLst>
-            </a:blip>
-            <a:stretch>
-              <a:fillRect/>
-            </a:stretch>
-          </p:blipFill>
-          <p:spPr bwMode="auto">
-            <a:xfrm>
-              <a:off x="146050" y="14287"/>
-              <a:ext cx="2651760" cy="1988820"/>
-            </a:xfrm>
-            <a:prstGeom prst="rect">
-              <a:avLst/>
-            </a:prstGeom>
-            <a:noFill/>
-            <a:ln>
-              <a:noFill/>
-            </a:ln>
-            <a:extLst>
-              <a:ext uri="{FAA26D3D-D897-4be2-8F04-BA451C77F1D7}">
-                <ma14:placeholderFlag xmlns:ma14="http://schemas.microsoft.com/office/mac/drawingml/2011/main"/>
-              </a:ext>
-            </a:extLst>
-          </p:spPr>
-        </p:pic>
-      </p:grpSp>
-      <p:grpSp>
-        <p:nvGrpSpPr>
-          <p:cNvPr id="9" name="Gruppierung 8"/>
-          <p:cNvGrpSpPr/>
-          <p:nvPr/>
-        </p:nvGrpSpPr>
-        <p:grpSpPr>
-          <a:xfrm>
-            <a:off x="5634768" y="4571816"/>
-            <a:ext cx="2971165" cy="3253104"/>
-            <a:chOff x="-14605" y="548680"/>
-            <a:chExt cx="2971800" cy="3199909"/>
-          </a:xfrm>
-        </p:grpSpPr>
-        <p:sp>
-          <p:nvSpPr>
-            <p:cNvPr id="10" name="Textfeld 9"/>
-            <p:cNvSpPr txBox="1"/>
-            <p:nvPr/>
-          </p:nvSpPr>
-          <p:spPr>
-            <a:xfrm>
-              <a:off x="-14605" y="2645960"/>
-              <a:ext cx="2971800" cy="1102629"/>
-            </a:xfrm>
-            <a:prstGeom prst="rect">
-              <a:avLst/>
-            </a:prstGeom>
-            <a:noFill/>
-            <a:ln>
-              <a:noFill/>
-            </a:ln>
-            <a:effectLst/>
-            <a:extLst>
-              <a:ext uri="{C572A759-6A51-4108-AA02-DFA0A04FC94B}">
-                <ma14:wrappingTextBoxFlag xmlns:ma14="http://schemas.microsoft.com/office/mac/drawingml/2011/main"/>
-              </a:ext>
-            </a:extLst>
-          </p:spPr>
-          <p:style>
-            <a:lnRef idx="0">
-              <a:schemeClr val="accent1"/>
-            </a:lnRef>
-            <a:fillRef idx="0">
-              <a:schemeClr val="accent1"/>
-            </a:fillRef>
-            <a:effectRef idx="0">
-              <a:schemeClr val="accent1"/>
-            </a:effectRef>
-            <a:fontRef idx="minor">
-              <a:schemeClr val="dk1"/>
-            </a:fontRef>
-          </p:style>
-          <p:txBody>
-            <a:bodyPr rot="0" spcFirstLastPara="0" vert="horz" wrap="square" lIns="91440" tIns="45720" rIns="91440" bIns="45720" numCol="1" spcCol="0" rtlCol="0" fromWordArt="0" anchor="t" anchorCtr="0" forceAA="0" compatLnSpc="1">
-              <a:prstTxWarp prst="textNoShape">
-                <a:avLst/>
-              </a:prstTxWarp>
-              <a:noAutofit/>
-            </a:bodyPr>
-            <a:lstStyle/>
-            <a:p>
-              <a:pPr>
-                <a:spcAft>
-                  <a:spcPts val="0"/>
-                </a:spcAft>
-              </a:pPr>
-              <a:r>
-                <a:rPr lang="en-US" sz="1050" dirty="0" err="1">
-                  <a:solidFill>
-                    <a:srgbClr val="000000"/>
-                  </a:solidFill>
-                  <a:effectLst/>
-                  <a:latin typeface="Cambria"/>
-                  <a:ea typeface="Calibri"/>
-                  <a:cs typeface="Times New Roman"/>
-                </a:rPr>
-                <a:t>RiboTaper</a:t>
-              </a:r>
-              <a:r>
-                <a:rPr lang="en-US" sz="1050" dirty="0">
-                  <a:solidFill>
-                    <a:srgbClr val="000000"/>
-                  </a:solidFill>
-                  <a:effectLst/>
-                  <a:latin typeface="Cambria"/>
-                  <a:ea typeface="Calibri"/>
-                  <a:cs typeface="Times New Roman"/>
-                </a:rPr>
-                <a:t>: </a:t>
-              </a:r>
-              <a:r>
-                <a:rPr lang="en-US" sz="1050" dirty="0">
-                  <a:solidFill>
-                    <a:srgbClr val="000000"/>
-                  </a:solidFill>
-                  <a:effectLst/>
-                  <a:latin typeface="Cambria"/>
-                  <a:ea typeface="Times New Roman"/>
-                  <a:cs typeface="Arial"/>
-                </a:rPr>
-                <a:t> P-site positions are color-coded by the frame; the method estimates the significance of each frequency component. Exons from different transcript classes are shown with their periodicity significance </a:t>
-              </a:r>
-              <a:r>
-                <a:rPr lang="en-US" sz="1050" dirty="0">
-                  <a:solidFill>
-                    <a:srgbClr val="000000"/>
-                  </a:solidFill>
-                  <a:effectLst/>
-                  <a:latin typeface="Cambria"/>
-                  <a:ea typeface="Calibri"/>
-                  <a:cs typeface="Times New Roman"/>
-                </a:rPr>
-                <a:t>(</a:t>
-              </a:r>
-              <a:r>
-                <a:rPr lang="en-US" sz="1050" dirty="0" err="1">
-                  <a:solidFill>
-                    <a:srgbClr val="000000"/>
-                  </a:solidFill>
-                  <a:effectLst/>
-                  <a:latin typeface="Cambria"/>
-                  <a:ea typeface="Calibri"/>
-                  <a:cs typeface="Times New Roman"/>
-                </a:rPr>
-                <a:t>Calviello</a:t>
-              </a:r>
-              <a:r>
-                <a:rPr lang="en-US" sz="1050" dirty="0">
-                  <a:solidFill>
-                    <a:srgbClr val="000000"/>
-                  </a:solidFill>
-                  <a:effectLst/>
-                  <a:latin typeface="Cambria"/>
-                  <a:ea typeface="Calibri"/>
-                  <a:cs typeface="Times New Roman"/>
-                </a:rPr>
-                <a:t> </a:t>
-              </a:r>
-              <a:r>
-                <a:rPr lang="en-US" sz="1050" i="1" dirty="0">
-                  <a:solidFill>
-                    <a:srgbClr val="000000"/>
-                  </a:solidFill>
-                  <a:effectLst/>
-                  <a:latin typeface="Cambria"/>
-                  <a:ea typeface="Calibri"/>
-                  <a:cs typeface="Times New Roman"/>
-                </a:rPr>
-                <a:t>et al. </a:t>
-              </a:r>
-              <a:r>
-                <a:rPr lang="en-US" sz="1050" dirty="0">
-                  <a:solidFill>
-                    <a:srgbClr val="000000"/>
-                  </a:solidFill>
-                  <a:effectLst/>
-                  <a:latin typeface="Cambria"/>
-                  <a:ea typeface="Calibri"/>
-                  <a:cs typeface="Times New Roman"/>
-                </a:rPr>
-                <a:t>Nature Met. 2016)</a:t>
-              </a:r>
-              <a:endParaRPr lang="en-US" sz="1200" dirty="0">
-                <a:effectLst/>
-                <a:ea typeface="Calibri"/>
-                <a:cs typeface="Times New Roman"/>
-              </a:endParaRPr>
-            </a:p>
-          </p:txBody>
-        </p:sp>
-        <p:pic>
-          <p:nvPicPr>
-            <p:cNvPr id="11" name="Bild 10"/>
-            <p:cNvPicPr>
-              <a:picLocks noChangeAspect="1"/>
-            </p:cNvPicPr>
-            <p:nvPr/>
-          </p:nvPicPr>
-          <p:blipFill>
-            <a:blip r:embed="rId4">
-              <a:extLst>
-                <a:ext uri="{28A0092B-C50C-407E-A947-70E740481C1C}">
-                  <a14:useLocalDpi xmlns:a14="http://schemas.microsoft.com/office/drawing/2010/main" val="0"/>
-                </a:ext>
-              </a:extLst>
-            </a:blip>
-            <a:stretch>
-              <a:fillRect/>
-            </a:stretch>
-          </p:blipFill>
-          <p:spPr bwMode="auto">
-            <a:xfrm>
-              <a:off x="199433" y="548680"/>
-              <a:ext cx="2720749" cy="2030399"/>
-            </a:xfrm>
-            <a:prstGeom prst="rect">
-              <a:avLst/>
-            </a:prstGeom>
-            <a:noFill/>
-            <a:ln>
-              <a:noFill/>
-            </a:ln>
-            <a:extLst>
-              <a:ext uri="{FAA26D3D-D897-4be2-8F04-BA451C77F1D7}">
-                <ma14:placeholderFlag xmlns:ma14="http://schemas.microsoft.com/office/mac/drawingml/2011/main"/>
-              </a:ext>
-            </a:extLst>
-          </p:spPr>
-        </p:pic>
-      </p:grpSp>
-      <p:sp>
-        <p:nvSpPr>
-          <p:cNvPr id="12" name="Rechteck 11"/>
-          <p:cNvSpPr/>
-          <p:nvPr/>
-        </p:nvSpPr>
+          </a:blip>
+          <a:stretch>
+            <a:fillRect/>
+          </a:stretch>
+        </p:blipFill>
         <p:spPr>
           <a:xfrm>
-            <a:off x="105834" y="1623755"/>
-            <a:ext cx="4572000" cy="4801315"/>
+            <a:off x="2106189" y="2070220"/>
+            <a:ext cx="1903544" cy="1427657"/>
           </a:xfrm>
           <a:prstGeom prst="rect">
             <a:avLst/>
           </a:prstGeom>
         </p:spPr>
+      </p:pic>
+      <p:sp>
+        <p:nvSpPr>
+          <p:cNvPr id="31" name="Rechteck 30"/>
+          <p:cNvSpPr/>
+          <p:nvPr/>
+        </p:nvSpPr>
+        <p:spPr>
+          <a:xfrm>
+            <a:off x="60065" y="1278502"/>
+            <a:ext cx="8984181" cy="343222"/>
+          </a:xfrm>
+          <a:prstGeom prst="rect">
+            <a:avLst/>
+          </a:prstGeom>
+          <a:noFill/>
+          <a:ln w="38100" cmpd="sng">
+            <a:solidFill>
+              <a:schemeClr val="tx1"/>
+            </a:solidFill>
+          </a:ln>
+        </p:spPr>
+        <p:style>
+          <a:lnRef idx="1">
+            <a:schemeClr val="accent1"/>
+          </a:lnRef>
+          <a:fillRef idx="3">
+            <a:schemeClr val="accent1"/>
+          </a:fillRef>
+          <a:effectRef idx="2">
+            <a:schemeClr val="accent1"/>
+          </a:effectRef>
+          <a:fontRef idx="minor">
+            <a:schemeClr val="lt1"/>
+          </a:fontRef>
+        </p:style>
+        <p:txBody>
+          <a:bodyPr rtlCol="0" anchor="ctr"/>
+          <a:lstStyle/>
+          <a:p>
+            <a:pPr algn="ctr"/>
+            <a:endParaRPr lang="de-DE"/>
+          </a:p>
+        </p:txBody>
+      </p:sp>
+      <p:sp>
+        <p:nvSpPr>
+          <p:cNvPr id="32" name="Textfeld 31"/>
+          <p:cNvSpPr txBox="1"/>
+          <p:nvPr/>
+        </p:nvSpPr>
+        <p:spPr>
+          <a:xfrm>
+            <a:off x="1826755" y="1247276"/>
+            <a:ext cx="1885658" cy="369332"/>
+          </a:xfrm>
+          <a:prstGeom prst="rect">
+            <a:avLst/>
+          </a:prstGeom>
+          <a:noFill/>
+        </p:spPr>
+        <p:txBody>
+          <a:bodyPr wrap="square" rtlCol="0">
+            <a:spAutoFit/>
+          </a:bodyPr>
+          <a:lstStyle/>
+          <a:p>
+            <a:r>
+              <a:rPr lang="de-DE" dirty="0" err="1" smtClean="0"/>
+              <a:t>Galaxy</a:t>
+            </a:r>
+            <a:r>
+              <a:rPr lang="de-DE" dirty="0" smtClean="0"/>
+              <a:t> </a:t>
+            </a:r>
+            <a:r>
+              <a:rPr lang="de-DE" b="1" dirty="0" smtClean="0"/>
+              <a:t>Server</a:t>
+            </a:r>
+            <a:endParaRPr lang="de-DE" b="1" dirty="0"/>
+          </a:p>
+        </p:txBody>
+      </p:sp>
+      <p:sp>
+        <p:nvSpPr>
+          <p:cNvPr id="33" name="Rechteck 32"/>
+          <p:cNvSpPr/>
+          <p:nvPr/>
+        </p:nvSpPr>
+        <p:spPr>
+          <a:xfrm>
+            <a:off x="80250" y="3666082"/>
+            <a:ext cx="2957381" cy="382012"/>
+          </a:xfrm>
+          <a:prstGeom prst="rect">
+            <a:avLst/>
+          </a:prstGeom>
+          <a:ln/>
+        </p:spPr>
+        <p:style>
+          <a:lnRef idx="2">
+            <a:schemeClr val="accent2">
+              <a:shade val="50000"/>
+            </a:schemeClr>
+          </a:lnRef>
+          <a:fillRef idx="1">
+            <a:schemeClr val="accent2"/>
+          </a:fillRef>
+          <a:effectRef idx="0">
+            <a:schemeClr val="accent2"/>
+          </a:effectRef>
+          <a:fontRef idx="minor">
+            <a:schemeClr val="lt1"/>
+          </a:fontRef>
+        </p:style>
+        <p:txBody>
+          <a:bodyPr rtlCol="0" anchor="ctr"/>
+          <a:lstStyle/>
+          <a:p>
+            <a:pPr algn="ctr"/>
+            <a:endParaRPr lang="de-DE"/>
+          </a:p>
+        </p:txBody>
+      </p:sp>
+      <p:sp>
+        <p:nvSpPr>
+          <p:cNvPr id="34" name="Textfeld 33"/>
+          <p:cNvSpPr txBox="1"/>
+          <p:nvPr/>
+        </p:nvSpPr>
+        <p:spPr>
+          <a:xfrm>
+            <a:off x="88831" y="3666082"/>
+            <a:ext cx="3815469" cy="369332"/>
+          </a:xfrm>
+          <a:prstGeom prst="rect">
+            <a:avLst/>
+          </a:prstGeom>
+          <a:noFill/>
+        </p:spPr>
+        <p:txBody>
+          <a:bodyPr wrap="square" rtlCol="0">
+            <a:spAutoFit/>
+          </a:bodyPr>
+          <a:lstStyle/>
+          <a:p>
+            <a:r>
+              <a:rPr lang="de-DE" dirty="0" err="1" smtClean="0"/>
+              <a:t>We</a:t>
+            </a:r>
+            <a:r>
+              <a:rPr lang="de-DE" dirty="0" smtClean="0"/>
+              <a:t> </a:t>
+            </a:r>
+            <a:r>
+              <a:rPr lang="de-DE" dirty="0" err="1" smtClean="0"/>
+              <a:t>have</a:t>
+            </a:r>
+            <a:r>
+              <a:rPr lang="de-DE" dirty="0" smtClean="0"/>
+              <a:t> a </a:t>
+            </a:r>
+            <a:r>
+              <a:rPr lang="de-DE" dirty="0" err="1" smtClean="0"/>
+              <a:t>growing</a:t>
+            </a:r>
+            <a:r>
+              <a:rPr lang="de-DE" dirty="0" smtClean="0"/>
+              <a:t> </a:t>
+            </a:r>
+            <a:r>
+              <a:rPr lang="de-DE" dirty="0" err="1" smtClean="0"/>
+              <a:t>user</a:t>
+            </a:r>
+            <a:r>
+              <a:rPr lang="de-DE" dirty="0" smtClean="0"/>
+              <a:t> </a:t>
+            </a:r>
+            <a:r>
+              <a:rPr lang="de-DE" dirty="0" err="1" smtClean="0"/>
+              <a:t>base</a:t>
+            </a:r>
+            <a:endParaRPr lang="de-DE" dirty="0"/>
+          </a:p>
+        </p:txBody>
+      </p:sp>
+      <p:sp>
+        <p:nvSpPr>
+          <p:cNvPr id="39" name="Rechteck 38"/>
+          <p:cNvSpPr/>
+          <p:nvPr/>
+        </p:nvSpPr>
+        <p:spPr>
+          <a:xfrm>
+            <a:off x="77229" y="1813566"/>
+            <a:ext cx="1012543" cy="382012"/>
+          </a:xfrm>
+          <a:prstGeom prst="rect">
+            <a:avLst/>
+          </a:prstGeom>
+          <a:ln/>
+        </p:spPr>
+        <p:style>
+          <a:lnRef idx="2">
+            <a:schemeClr val="accent2">
+              <a:shade val="50000"/>
+            </a:schemeClr>
+          </a:lnRef>
+          <a:fillRef idx="1">
+            <a:schemeClr val="accent2"/>
+          </a:fillRef>
+          <a:effectRef idx="0">
+            <a:schemeClr val="accent2"/>
+          </a:effectRef>
+          <a:fontRef idx="minor">
+            <a:schemeClr val="lt1"/>
+          </a:fontRef>
+        </p:style>
+        <p:txBody>
+          <a:bodyPr rtlCol="0" anchor="ctr"/>
+          <a:lstStyle/>
+          <a:p>
+            <a:pPr algn="ctr"/>
+            <a:endParaRPr lang="de-DE"/>
+          </a:p>
+        </p:txBody>
+      </p:sp>
+      <p:sp>
+        <p:nvSpPr>
+          <p:cNvPr id="41" name="Textfeld 40"/>
+          <p:cNvSpPr txBox="1"/>
+          <p:nvPr/>
+        </p:nvSpPr>
+        <p:spPr>
+          <a:xfrm>
+            <a:off x="60066" y="1830550"/>
+            <a:ext cx="1029705" cy="369332"/>
+          </a:xfrm>
+          <a:prstGeom prst="rect">
+            <a:avLst/>
+          </a:prstGeom>
+          <a:noFill/>
+        </p:spPr>
+        <p:txBody>
+          <a:bodyPr wrap="square" rtlCol="0">
+            <a:spAutoFit/>
+          </a:bodyPr>
+          <a:lstStyle/>
+          <a:p>
+            <a:r>
+              <a:rPr lang="de-DE" dirty="0" smtClean="0"/>
+              <a:t>Training</a:t>
+            </a:r>
+            <a:endParaRPr lang="de-DE" dirty="0"/>
+          </a:p>
+        </p:txBody>
+      </p:sp>
+      <p:pic>
+        <p:nvPicPr>
+          <p:cNvPr id="42" name="Bild 41" descr="galaxyLogo360.png"/>
+          <p:cNvPicPr>
+            <a:picLocks noChangeAspect="1"/>
+          </p:cNvPicPr>
+          <p:nvPr/>
+        </p:nvPicPr>
+        <p:blipFill>
+          <a:blip r:embed="rId5">
+            <a:extLst>
+              <a:ext uri="{28A0092B-C50C-407E-A947-70E740481C1C}">
+                <a14:useLocalDpi xmlns:a14="http://schemas.microsoft.com/office/drawing/2010/main" val="0"/>
+              </a:ext>
+            </a:extLst>
+          </a:blip>
+          <a:stretch>
+            <a:fillRect/>
+          </a:stretch>
+        </p:blipFill>
+        <p:spPr>
+          <a:xfrm>
+            <a:off x="1280151" y="1261913"/>
+            <a:ext cx="1280646" cy="355735"/>
+          </a:xfrm>
+          <a:prstGeom prst="rect">
+            <a:avLst/>
+          </a:prstGeom>
+        </p:spPr>
+      </p:pic>
+      <p:sp>
+        <p:nvSpPr>
+          <p:cNvPr id="44" name="Textfeld 43"/>
+          <p:cNvSpPr txBox="1"/>
+          <p:nvPr/>
+        </p:nvSpPr>
+        <p:spPr>
+          <a:xfrm>
+            <a:off x="5781458" y="1247276"/>
+            <a:ext cx="2533414" cy="369332"/>
+          </a:xfrm>
+          <a:prstGeom prst="rect">
+            <a:avLst/>
+          </a:prstGeom>
+          <a:noFill/>
+        </p:spPr>
+        <p:txBody>
+          <a:bodyPr wrap="square" rtlCol="0">
+            <a:spAutoFit/>
+          </a:bodyPr>
+          <a:lstStyle/>
+          <a:p>
+            <a:r>
+              <a:rPr lang="de-DE" dirty="0" smtClean="0"/>
+              <a:t>Tools </a:t>
+            </a:r>
+            <a:r>
+              <a:rPr lang="de-DE" dirty="0" err="1" smtClean="0"/>
+              <a:t>and</a:t>
+            </a:r>
+            <a:r>
+              <a:rPr lang="de-DE" dirty="0" smtClean="0"/>
+              <a:t> Databases</a:t>
+            </a:r>
+            <a:endParaRPr lang="de-DE" dirty="0"/>
+          </a:p>
+        </p:txBody>
+      </p:sp>
+      <p:sp>
+        <p:nvSpPr>
+          <p:cNvPr id="45" name="Rechteck 44"/>
+          <p:cNvSpPr/>
+          <p:nvPr/>
+        </p:nvSpPr>
+        <p:spPr>
+          <a:xfrm>
+            <a:off x="4572000" y="2081110"/>
+            <a:ext cx="4572000" cy="3939541"/>
+          </a:xfrm>
+          <a:prstGeom prst="rect">
+            <a:avLst/>
+          </a:prstGeom>
+        </p:spPr>
         <p:txBody>
           <a:bodyPr>
             <a:spAutoFit/>
           </a:bodyPr>
           <a:lstStyle/>
           <a:p>
-            <a:pPr lvl="0"/>
-            <a:r>
-              <a:rPr lang="en-US" b="1" dirty="0" err="1"/>
-              <a:t>DoRiNA</a:t>
-            </a:r>
-            <a:r>
-              <a:rPr lang="en-US" b="1" dirty="0"/>
-              <a:t> database</a:t>
-            </a:r>
-            <a:r>
-              <a:rPr lang="en-US" dirty="0"/>
-              <a:t> – Database for RNA-binding protein binding sites and </a:t>
-            </a:r>
-            <a:r>
-              <a:rPr lang="en-US" dirty="0" err="1"/>
-              <a:t>miRNA</a:t>
-            </a:r>
-            <a:r>
-              <a:rPr lang="en-US" dirty="0"/>
-              <a:t> binding sites from various resources including our in-house tool PicTar2</a:t>
-            </a:r>
-          </a:p>
-          <a:p>
-            <a:pPr lvl="0"/>
-            <a:r>
-              <a:rPr lang="en-US" b="1" dirty="0" err="1"/>
-              <a:t>RiboTaper</a:t>
-            </a:r>
-            <a:r>
-              <a:rPr lang="en-US" dirty="0"/>
-              <a:t> – A toolbox for analysis of Ribosome profiling data</a:t>
-            </a:r>
-          </a:p>
-          <a:p>
-            <a:pPr lvl="0"/>
             <a:r>
               <a:rPr lang="en-US" b="1" dirty="0"/>
               <a:t>RCAS</a:t>
             </a:r>
             <a:r>
               <a:rPr lang="en-US" dirty="0"/>
-              <a:t> – A pipeline for annotation of RNA-specific features such as RNA-modification sites and RBP binding sites.</a:t>
-            </a:r>
+              <a:t> </a:t>
+            </a:r>
+            <a:r>
+              <a:rPr lang="en-US" dirty="0" smtClean="0"/>
+              <a:t>– RNA</a:t>
+            </a:r>
+            <a:r>
+              <a:rPr lang="en-US" dirty="0"/>
+              <a:t>-centric annotation </a:t>
+            </a:r>
+            <a:r>
+              <a:rPr lang="en-US" dirty="0" smtClean="0"/>
+              <a:t>system </a:t>
+            </a:r>
+            <a:r>
+              <a:rPr lang="en-US" sz="1600" dirty="0" smtClean="0"/>
+              <a:t>(</a:t>
+            </a:r>
+            <a:r>
+              <a:rPr lang="en-US" sz="1600" b="1" dirty="0" smtClean="0"/>
+              <a:t>Manuscript</a:t>
+            </a:r>
+            <a:r>
+              <a:rPr lang="en-US" sz="1600" dirty="0" smtClean="0"/>
+              <a:t> submitted – available on </a:t>
+            </a:r>
+            <a:r>
+              <a:rPr lang="en-US" sz="1600" b="1" dirty="0" err="1" smtClean="0"/>
+              <a:t>Bioconductor</a:t>
+            </a:r>
+            <a:r>
+              <a:rPr lang="en-US" sz="1600" dirty="0" smtClean="0"/>
+              <a:t>)</a:t>
+            </a:r>
+            <a:endParaRPr lang="en-US" sz="1600" dirty="0"/>
+          </a:p>
+          <a:p>
+            <a:pPr lvl="0"/>
+            <a:endParaRPr lang="en-US" b="1" dirty="0" smtClean="0"/>
+          </a:p>
+          <a:p>
+            <a:pPr lvl="0"/>
+            <a:r>
+              <a:rPr lang="en-US" b="1" dirty="0" err="1" smtClean="0"/>
+              <a:t>DoRiNA</a:t>
+            </a:r>
+            <a:r>
+              <a:rPr lang="en-US" b="1" dirty="0" smtClean="0"/>
+              <a:t> </a:t>
+            </a:r>
+            <a:r>
+              <a:rPr lang="en-US" b="1" dirty="0"/>
+              <a:t>database</a:t>
+            </a:r>
+            <a:r>
+              <a:rPr lang="en-US" dirty="0"/>
+              <a:t> – Database for </a:t>
+            </a:r>
+            <a:r>
+              <a:rPr lang="en-US" dirty="0" smtClean="0"/>
+              <a:t>binding sites of RNA</a:t>
+            </a:r>
+            <a:r>
+              <a:rPr lang="en-US" dirty="0"/>
+              <a:t>-binding </a:t>
+            </a:r>
+            <a:r>
+              <a:rPr lang="en-US" dirty="0" smtClean="0"/>
+              <a:t>proteins and </a:t>
+            </a:r>
+            <a:r>
+              <a:rPr lang="en-US" dirty="0" err="1" smtClean="0"/>
+              <a:t>miRNAs</a:t>
+            </a:r>
+            <a:endParaRPr lang="en-US" dirty="0" smtClean="0"/>
+          </a:p>
+          <a:p>
+            <a:pPr lvl="0"/>
+            <a:endParaRPr lang="en-US" b="1" dirty="0"/>
+          </a:p>
+          <a:p>
+            <a:pPr lvl="0"/>
+            <a:r>
+              <a:rPr lang="en-US" b="1" dirty="0" err="1" smtClean="0"/>
+              <a:t>RiboTaper</a:t>
+            </a:r>
+            <a:r>
+              <a:rPr lang="en-US" dirty="0" smtClean="0"/>
+              <a:t> </a:t>
+            </a:r>
+            <a:r>
+              <a:rPr lang="en-US" dirty="0"/>
+              <a:t>– A toolbox for analysis of Ribosome profiling </a:t>
+            </a:r>
+            <a:r>
+              <a:rPr lang="en-US" dirty="0" smtClean="0"/>
+              <a:t>data</a:t>
+            </a:r>
+          </a:p>
+          <a:p>
+            <a:pPr lvl="0"/>
+            <a:endParaRPr lang="en-US" dirty="0"/>
           </a:p>
           <a:p>
             <a:pPr lvl="0"/>
@@ -3632,8 +3721,16 @@
             </a:r>
             <a:r>
               <a:rPr lang="en-US" dirty="0"/>
-              <a:t> – MicroRNA target site identification by integrating sequence and binding information</a:t>
-            </a:r>
+              <a:t> – MicroRNA target site identification </a:t>
+            </a:r>
+            <a:r>
+              <a:rPr lang="en-US" dirty="0" smtClean="0"/>
+              <a:t>tool</a:t>
+            </a:r>
+          </a:p>
+          <a:p>
+            <a:pPr lvl="0"/>
+            <a:endParaRPr lang="en-US" dirty="0"/>
           </a:p>
           <a:p>
             <a:pPr lvl="0"/>
@@ -3646,41 +3743,282 @@
               <a:t> - definition of RNA binding sites from PAR-CLIP short-read sequence data</a:t>
             </a:r>
           </a:p>
-          <a:p>
-            <a:pPr lvl="0"/>
-            <a:r>
-              <a:rPr lang="en-GB" b="1" dirty="0"/>
-              <a:t>Local Galaxy server </a:t>
-            </a:r>
-            <a:r>
-              <a:rPr lang="en-GB" dirty="0"/>
-              <a:t>– aimed for </a:t>
-            </a:r>
-            <a:r>
-              <a:rPr lang="en-GB" dirty="0" err="1"/>
-              <a:t>wetlab</a:t>
-            </a:r>
-            <a:r>
-              <a:rPr lang="en-GB" dirty="0"/>
-              <a:t> researchers being able to run bioinformatics tools and analysis pipelines developed for</a:t>
-            </a:r>
-            <a:r>
-              <a:rPr lang="en-US" dirty="0"/>
-              <a:t>. </a:t>
-            </a:r>
+        </p:txBody>
+      </p:sp>
+      <p:sp>
+        <p:nvSpPr>
+          <p:cNvPr id="46" name="Textfeld 45"/>
+          <p:cNvSpPr txBox="1"/>
+          <p:nvPr/>
+        </p:nvSpPr>
+        <p:spPr>
+          <a:xfrm>
+            <a:off x="114574" y="2279021"/>
+            <a:ext cx="1885658" cy="1200329"/>
+          </a:xfrm>
+          <a:prstGeom prst="rect">
+            <a:avLst/>
+          </a:prstGeom>
+          <a:noFill/>
+        </p:spPr>
+        <p:txBody>
+          <a:bodyPr wrap="square" rtlCol="0">
+            <a:spAutoFit/>
+          </a:bodyPr>
+          <a:lstStyle/>
+          <a:p>
+            <a:r>
+              <a:rPr lang="de-DE" dirty="0" err="1" smtClean="0"/>
+              <a:t>Offered</a:t>
+            </a:r>
+            <a:r>
+              <a:rPr lang="de-DE" dirty="0" smtClean="0"/>
+              <a:t> </a:t>
+            </a:r>
+            <a:r>
+              <a:rPr lang="de-DE" b="1" dirty="0" err="1" smtClean="0"/>
+              <a:t>two</a:t>
+            </a:r>
+            <a:r>
+              <a:rPr lang="de-DE" dirty="0" smtClean="0"/>
+              <a:t> </a:t>
+            </a:r>
+            <a:r>
+              <a:rPr lang="de-DE" b="1" dirty="0" err="1" smtClean="0"/>
+              <a:t>workshops</a:t>
+            </a:r>
+            <a:r>
+              <a:rPr lang="de-DE" dirty="0" smtClean="0"/>
+              <a:t> </a:t>
+            </a:r>
+            <a:r>
+              <a:rPr lang="de-DE" dirty="0" err="1" smtClean="0"/>
+              <a:t>for</a:t>
+            </a:r>
+            <a:r>
+              <a:rPr lang="de-DE" dirty="0" smtClean="0"/>
+              <a:t> RNA-</a:t>
+            </a:r>
+            <a:r>
+              <a:rPr lang="de-DE" dirty="0" err="1" smtClean="0"/>
+              <a:t>seq</a:t>
+            </a:r>
+            <a:r>
+              <a:rPr lang="de-DE" dirty="0" smtClean="0"/>
+              <a:t> </a:t>
+            </a:r>
+            <a:r>
+              <a:rPr lang="de-DE" dirty="0" err="1" smtClean="0"/>
+              <a:t>analysis</a:t>
+            </a:r>
+            <a:r>
+              <a:rPr lang="de-DE" dirty="0" smtClean="0"/>
+              <a:t> </a:t>
+            </a:r>
+            <a:r>
+              <a:rPr lang="de-DE" dirty="0" err="1" smtClean="0"/>
+              <a:t>using</a:t>
+            </a:r>
+            <a:r>
+              <a:rPr lang="de-DE" dirty="0" smtClean="0"/>
+              <a:t> </a:t>
+            </a:r>
+            <a:r>
+              <a:rPr lang="de-DE" b="1" dirty="0" err="1" smtClean="0"/>
+              <a:t>Galaxy</a:t>
+            </a:r>
+            <a:r>
+              <a:rPr lang="de-DE" b="1" dirty="0" smtClean="0"/>
+              <a:t> </a:t>
+            </a:r>
+            <a:endParaRPr lang="de-DE" b="1" dirty="0"/>
+          </a:p>
+        </p:txBody>
+      </p:sp>
+      <p:sp>
+        <p:nvSpPr>
+          <p:cNvPr id="48" name="Textfeld 47"/>
+          <p:cNvSpPr txBox="1"/>
+          <p:nvPr/>
+        </p:nvSpPr>
+        <p:spPr>
+          <a:xfrm>
+            <a:off x="2963427" y="4204403"/>
+            <a:ext cx="1464308" cy="2677656"/>
+          </a:xfrm>
+          <a:prstGeom prst="rect">
+            <a:avLst/>
+          </a:prstGeom>
+          <a:noFill/>
+        </p:spPr>
+        <p:txBody>
+          <a:bodyPr wrap="square" rtlCol="0">
+            <a:spAutoFit/>
+          </a:bodyPr>
+          <a:lstStyle/>
+          <a:p>
+            <a:r>
+              <a:rPr lang="de-DE" sz="1400" dirty="0" err="1" smtClean="0"/>
+              <a:t>We</a:t>
+            </a:r>
+            <a:r>
+              <a:rPr lang="de-DE" sz="1400" dirty="0" smtClean="0"/>
+              <a:t> do:</a:t>
+            </a:r>
+          </a:p>
+          <a:p>
+            <a:pPr marL="285750" indent="-285750">
+              <a:buFontTx/>
+              <a:buChar char="-"/>
+            </a:pPr>
+            <a:r>
+              <a:rPr lang="de-DE" sz="1400" dirty="0" smtClean="0"/>
+              <a:t>User </a:t>
+            </a:r>
+            <a:r>
+              <a:rPr lang="de-DE" sz="1400" b="1" dirty="0" err="1" smtClean="0"/>
+              <a:t>consultation</a:t>
+            </a:r>
+            <a:endParaRPr lang="de-DE" sz="1400" b="1" dirty="0" smtClean="0"/>
+          </a:p>
+          <a:p>
+            <a:pPr marL="285750" indent="-285750">
+              <a:buFontTx/>
+              <a:buChar char="-"/>
+            </a:pPr>
+            <a:endParaRPr lang="de-DE" sz="1400" b="1" dirty="0" smtClean="0"/>
+          </a:p>
+          <a:p>
+            <a:pPr marL="285750" indent="-285750">
+              <a:buFontTx/>
+              <a:buChar char="-"/>
+            </a:pPr>
+            <a:r>
+              <a:rPr lang="de-DE" sz="1400" b="1" dirty="0" smtClean="0"/>
+              <a:t>Tool</a:t>
+            </a:r>
+            <a:r>
+              <a:rPr lang="de-DE" sz="1400" dirty="0" smtClean="0"/>
+              <a:t> </a:t>
+            </a:r>
+            <a:r>
+              <a:rPr lang="de-DE" sz="1400" dirty="0" err="1" smtClean="0"/>
+              <a:t>and</a:t>
+            </a:r>
+            <a:r>
+              <a:rPr lang="de-DE" sz="1400" dirty="0" smtClean="0"/>
+              <a:t> </a:t>
+            </a:r>
+            <a:r>
+              <a:rPr lang="de-DE" sz="1400" b="1" dirty="0" err="1" smtClean="0"/>
+              <a:t>workflow</a:t>
+            </a:r>
+            <a:r>
+              <a:rPr lang="de-DE" sz="1400" dirty="0" smtClean="0"/>
+              <a:t> </a:t>
+            </a:r>
+            <a:r>
+              <a:rPr lang="de-DE" sz="1400" dirty="0" err="1" smtClean="0"/>
+              <a:t>development</a:t>
+            </a:r>
+            <a:r>
+              <a:rPr lang="de-DE" sz="1400" dirty="0" smtClean="0"/>
+              <a:t> &amp; </a:t>
+            </a:r>
+            <a:r>
+              <a:rPr lang="de-DE" sz="1400" dirty="0" err="1" smtClean="0"/>
+              <a:t>integration</a:t>
+            </a:r>
+            <a:endParaRPr lang="de-DE" sz="1400" dirty="0" smtClean="0"/>
+          </a:p>
+          <a:p>
+            <a:pPr marL="285750" indent="-285750">
+              <a:buFontTx/>
+              <a:buChar char="-"/>
+            </a:pPr>
+            <a:endParaRPr lang="de-DE" sz="1400" dirty="0" smtClean="0"/>
+          </a:p>
+          <a:p>
+            <a:pPr marL="285750" indent="-285750">
+              <a:buFontTx/>
+              <a:buChar char="-"/>
+            </a:pPr>
+            <a:r>
+              <a:rPr lang="de-DE" sz="1400" dirty="0" smtClean="0"/>
+              <a:t>Database </a:t>
+            </a:r>
+            <a:r>
+              <a:rPr lang="de-DE" sz="1400" b="1" dirty="0" err="1" smtClean="0"/>
+              <a:t>maintenance</a:t>
+            </a:r>
+            <a:endParaRPr lang="de-DE" sz="1400" dirty="0" smtClean="0"/>
+          </a:p>
+          <a:p>
+            <a:endParaRPr lang="de-DE" sz="1400" dirty="0" smtClean="0"/>
+          </a:p>
+        </p:txBody>
+      </p:sp>
+      <p:sp>
+        <p:nvSpPr>
+          <p:cNvPr id="51" name="Rechteck 50"/>
+          <p:cNvSpPr/>
+          <p:nvPr/>
+        </p:nvSpPr>
+        <p:spPr>
+          <a:xfrm>
+            <a:off x="60065" y="1619675"/>
+            <a:ext cx="8984181" cy="5176116"/>
+          </a:xfrm>
+          <a:prstGeom prst="rect">
+            <a:avLst/>
+          </a:prstGeom>
+          <a:noFill/>
+          <a:ln w="38100" cmpd="sng">
+            <a:solidFill>
+              <a:schemeClr val="tx1"/>
+            </a:solidFill>
+          </a:ln>
+        </p:spPr>
+        <p:style>
+          <a:lnRef idx="1">
+            <a:schemeClr val="accent1"/>
+          </a:lnRef>
+          <a:fillRef idx="3">
+            <a:schemeClr val="accent1"/>
+          </a:fillRef>
+          <a:effectRef idx="2">
+            <a:schemeClr val="accent1"/>
+          </a:effectRef>
+          <a:fontRef idx="minor">
+            <a:schemeClr val="lt1"/>
+          </a:fontRef>
+        </p:style>
+        <p:txBody>
+          <a:bodyPr rtlCol="0" anchor="ctr"/>
+          <a:lstStyle/>
+          <a:p>
+            <a:pPr algn="ctr"/>
+            <a:endParaRPr lang="de-DE"/>
           </a:p>
         </p:txBody>
       </p:sp>
     </p:spTree>
     <p:extLst>
       <p:ext uri="{BB962C8B-B14F-4D97-AF65-F5344CB8AC3E}">
-        <p14:creationId xmlns:p14="http://schemas.microsoft.com/office/powerpoint/2010/main" val="2532317337"/>
+        <p14:creationId xmlns:p14="http://schemas.microsoft.com/office/powerpoint/2010/main" val="2171508083"/>
       </p:ext>
     </p:extLst>
   </p:cSld>
   <p:clrMapOvr>
     <a:masterClrMapping/>
   </p:clrMapOvr>
+  <p:timing>
+    <p:tnLst>
+      <p:par>
+        <p:cTn xmlns:p14="http://schemas.microsoft.com/office/powerpoint/2010/main" id="1" dur="indefinite" restart="never" nodeType="tmRoot"/>
+      </p:par>
+    </p:tnLst>
+  </p:timing>
 </p:sld>
 </file>
 

</xml_diff>

<commit_message>
added more logos for tools
</commit_message>
<xml_diff>
--- a/rbc_bimsb/sab-berlin-2016/slide_for_Rolfs_talk.pptx
+++ b/rbc_bimsb/sab-berlin-2016/slide_for_Rolfs_talk.pptx
@@ -10595,6 +10595,36 @@
           <a:chExt cx="0" cy="0"/>
         </a:xfrm>
       </p:grpSpPr>
+      <p:pic>
+        <p:nvPicPr>
+          <p:cNvPr id="5" name="Bild 4" descr="javalogo.jpg"/>
+          <p:cNvPicPr>
+            <a:picLocks noChangeAspect="1"/>
+          </p:cNvPicPr>
+          <p:nvPr/>
+        </p:nvPicPr>
+        <p:blipFill>
+          <a:blip r:embed="rId3">
+            <a:extLst>
+              <a:ext uri="{28A0092B-C50C-407E-A947-70E740481C1C}">
+                <a14:useLocalDpi xmlns:a14="http://schemas.microsoft.com/office/drawing/2010/main" val="0"/>
+              </a:ext>
+            </a:extLst>
+          </a:blip>
+          <a:stretch>
+            <a:fillRect/>
+          </a:stretch>
+        </p:blipFill>
+        <p:spPr>
+          <a:xfrm>
+            <a:off x="5615441" y="5789449"/>
+            <a:ext cx="667012" cy="400207"/>
+          </a:xfrm>
+          <a:prstGeom prst="rect">
+            <a:avLst/>
+          </a:prstGeom>
+        </p:spPr>
+      </p:pic>
       <p:sp>
         <p:nvSpPr>
           <p:cNvPr id="84" name="Shape 84"/>
@@ -10658,7 +10688,7 @@
           <p:nvPr/>
         </p:nvPicPr>
         <p:blipFill rotWithShape="1">
-          <a:blip r:embed="rId3">
+          <a:blip r:embed="rId4">
             <a:alphaModFix/>
           </a:blip>
           <a:srcRect/>
@@ -10995,7 +11025,7 @@
           <p:nvPr/>
         </p:nvPicPr>
         <p:blipFill rotWithShape="1">
-          <a:blip r:embed="rId4">
+          <a:blip r:embed="rId5">
             <a:alphaModFix/>
           </a:blip>
           <a:srcRect/>
@@ -11366,7 +11396,7 @@
           <p:nvPr/>
         </p:nvPicPr>
         <p:blipFill rotWithShape="1">
-          <a:blip r:embed="rId5">
+          <a:blip r:embed="rId6">
             <a:alphaModFix/>
           </a:blip>
           <a:srcRect/>
@@ -12223,7 +12253,7 @@
           <p:nvPr/>
         </p:nvPicPr>
         <p:blipFill>
-          <a:blip r:embed="rId6">
+          <a:blip r:embed="rId7">
             <a:alphaModFix/>
           </a:blip>
           <a:stretch>
@@ -12251,7 +12281,7 @@
           <p:nvPr/>
         </p:nvPicPr>
         <p:blipFill>
-          <a:blip r:embed="rId7">
+          <a:blip r:embed="rId8">
             <a:alphaModFix/>
           </a:blip>
           <a:stretch>
@@ -12279,7 +12309,7 @@
           <p:nvPr/>
         </p:nvPicPr>
         <p:blipFill>
-          <a:blip r:embed="rId8">
+          <a:blip r:embed="rId9">
             <a:alphaModFix/>
           </a:blip>
           <a:stretch>
@@ -12307,7 +12337,7 @@
           <p:nvPr/>
         </p:nvPicPr>
         <p:blipFill>
-          <a:blip r:embed="rId9">
+          <a:blip r:embed="rId10">
             <a:alphaModFix/>
           </a:blip>
           <a:stretch>
@@ -12335,7 +12365,7 @@
           <p:nvPr/>
         </p:nvPicPr>
         <p:blipFill>
-          <a:blip r:embed="rId6">
+          <a:blip r:embed="rId7">
             <a:alphaModFix/>
           </a:blip>
           <a:stretch>
@@ -12363,7 +12393,7 @@
           <p:nvPr/>
         </p:nvPicPr>
         <p:blipFill>
-          <a:blip r:embed="rId9">
+          <a:blip r:embed="rId10">
             <a:alphaModFix/>
           </a:blip>
           <a:stretch>
@@ -12391,7 +12421,7 @@
           <p:nvPr/>
         </p:nvPicPr>
         <p:blipFill>
-          <a:blip r:embed="rId10">
+          <a:blip r:embed="rId11">
             <a:alphaModFix/>
           </a:blip>
           <a:stretch>
@@ -12419,7 +12449,7 @@
           <p:nvPr/>
         </p:nvPicPr>
         <p:blipFill>
-          <a:blip r:embed="rId10">
+          <a:blip r:embed="rId11">
             <a:alphaModFix/>
           </a:blip>
           <a:stretch>
@@ -12447,7 +12477,7 @@
           <p:nvPr/>
         </p:nvPicPr>
         <p:blipFill>
-          <a:blip r:embed="rId11">
+          <a:blip r:embed="rId12">
             <a:alphaModFix/>
           </a:blip>
           <a:stretch>
@@ -12477,7 +12507,7 @@
           <p:nvPr/>
         </p:nvPicPr>
         <p:blipFill>
-          <a:blip r:embed="rId12">
+          <a:blip r:embed="rId13">
             <a:extLst>
               <a:ext uri="{28A0092B-C50C-407E-A947-70E740481C1C}">
                 <a14:useLocalDpi xmlns:a14="http://schemas.microsoft.com/office/drawing/2010/main" val="0"/>
@@ -12507,7 +12537,7 @@
           <p:nvPr/>
         </p:nvPicPr>
         <p:blipFill>
-          <a:blip r:embed="rId12">
+          <a:blip r:embed="rId13">
             <a:extLst>
               <a:ext uri="{28A0092B-C50C-407E-A947-70E740481C1C}">
                 <a14:useLocalDpi xmlns:a14="http://schemas.microsoft.com/office/drawing/2010/main" val="0"/>
@@ -12522,6 +12552,66 @@
           <a:xfrm>
             <a:off x="6541021" y="2784757"/>
             <a:ext cx="367868" cy="366853"/>
+          </a:xfrm>
+          <a:prstGeom prst="rect">
+            <a:avLst/>
+          </a:prstGeom>
+        </p:spPr>
+      </p:pic>
+      <p:pic>
+        <p:nvPicPr>
+          <p:cNvPr id="4" name="Bild 3" descr="Perllogo.png"/>
+          <p:cNvPicPr>
+            <a:picLocks noChangeAspect="1"/>
+          </p:cNvPicPr>
+          <p:nvPr/>
+        </p:nvPicPr>
+        <p:blipFill>
+          <a:blip r:embed="rId14">
+            <a:extLst>
+              <a:ext uri="{28A0092B-C50C-407E-A947-70E740481C1C}">
+                <a14:useLocalDpi xmlns:a14="http://schemas.microsoft.com/office/drawing/2010/main" val="0"/>
+              </a:ext>
+            </a:extLst>
+          </a:blip>
+          <a:stretch>
+            <a:fillRect/>
+          </a:stretch>
+        </p:blipFill>
+        <p:spPr>
+          <a:xfrm>
+            <a:off x="6148651" y="4982792"/>
+            <a:ext cx="779926" cy="391182"/>
+          </a:xfrm>
+          <a:prstGeom prst="rect">
+            <a:avLst/>
+          </a:prstGeom>
+        </p:spPr>
+      </p:pic>
+      <p:pic>
+        <p:nvPicPr>
+          <p:cNvPr id="6" name="Bild 5" descr="python-logo-master.png"/>
+          <p:cNvPicPr>
+            <a:picLocks noChangeAspect="1"/>
+          </p:cNvPicPr>
+          <p:nvPr/>
+        </p:nvPicPr>
+        <p:blipFill>
+          <a:blip r:embed="rId15">
+            <a:extLst>
+              <a:ext uri="{28A0092B-C50C-407E-A947-70E740481C1C}">
+                <a14:useLocalDpi xmlns:a14="http://schemas.microsoft.com/office/drawing/2010/main" val="0"/>
+              </a:ext>
+            </a:extLst>
+          </a:blip>
+          <a:stretch>
+            <a:fillRect/>
+          </a:stretch>
+        </p:blipFill>
+        <p:spPr>
+          <a:xfrm>
+            <a:off x="6908889" y="2785948"/>
+            <a:ext cx="843007" cy="365662"/>
           </a:xfrm>
           <a:prstGeom prst="rect">
             <a:avLst/>

</xml_diff>

<commit_message>
removed language logos, added galaxy logo for dorina
</commit_message>
<xml_diff>
--- a/rbc_bimsb/sab-berlin-2016/slide_for_Rolfs_talk.pptx
+++ b/rbc_bimsb/sab-berlin-2016/slide_for_Rolfs_talk.pptx
@@ -10597,98 +10597,12 @@
       </p:grpSpPr>
       <p:pic>
         <p:nvPicPr>
-          <p:cNvPr id="5" name="Bild 4" descr="javalogo.jpg"/>
-          <p:cNvPicPr>
-            <a:picLocks noChangeAspect="1"/>
-          </p:cNvPicPr>
-          <p:nvPr/>
-        </p:nvPicPr>
-        <p:blipFill>
-          <a:blip r:embed="rId3">
-            <a:extLst>
-              <a:ext uri="{28A0092B-C50C-407E-A947-70E740481C1C}">
-                <a14:useLocalDpi xmlns:a14="http://schemas.microsoft.com/office/drawing/2010/main" val="0"/>
-              </a:ext>
-            </a:extLst>
-          </a:blip>
-          <a:stretch>
-            <a:fillRect/>
-          </a:stretch>
-        </p:blipFill>
-        <p:spPr>
-          <a:xfrm>
-            <a:off x="5615441" y="5789449"/>
-            <a:ext cx="667012" cy="400207"/>
-          </a:xfrm>
-          <a:prstGeom prst="rect">
-            <a:avLst/>
-          </a:prstGeom>
-        </p:spPr>
-      </p:pic>
-      <p:sp>
-        <p:nvSpPr>
-          <p:cNvPr id="84" name="Shape 84"/>
-          <p:cNvSpPr/>
-          <p:nvPr/>
-        </p:nvSpPr>
-        <p:spPr>
-          <a:xfrm>
-            <a:off x="60065" y="1619675"/>
-            <a:ext cx="8984100" cy="5176200"/>
-          </a:xfrm>
-          <a:prstGeom prst="rect">
-            <a:avLst/>
-          </a:prstGeom>
-          <a:noFill/>
-          <a:ln w="38100" cap="flat" cmpd="sng">
-            <a:solidFill>
-              <a:schemeClr val="dk1"/>
-            </a:solidFill>
-            <a:prstDash val="solid"/>
-            <a:round/>
-            <a:headEnd type="none" w="med" len="med"/>
-            <a:tailEnd type="none" w="med" len="med"/>
-          </a:ln>
-          <a:effectLst>
-            <a:outerShdw blurRad="39999" dist="23000" dir="5400000" rotWithShape="0">
-              <a:srgbClr val="000000">
-                <a:alpha val="34900"/>
-              </a:srgbClr>
-            </a:outerShdw>
-          </a:effectLst>
-        </p:spPr>
-        <p:txBody>
-          <a:bodyPr lIns="91425" tIns="45700" rIns="91425" bIns="45700" anchor="ctr" anchorCtr="0">
-            <a:noAutofit/>
-          </a:bodyPr>
-          <a:lstStyle/>
-          <a:p>
-            <a:pPr marL="0" marR="0" lvl="0" indent="0" algn="ctr" rtl="0">
-              <a:spcBef>
-                <a:spcPts val="0"/>
-              </a:spcBef>
-              <a:buNone/>
-            </a:pPr>
-            <a:endParaRPr sz="1800">
-              <a:solidFill>
-                <a:schemeClr val="lt1"/>
-              </a:solidFill>
-              <a:latin typeface="Calibri"/>
-              <a:ea typeface="Calibri"/>
-              <a:cs typeface="Calibri"/>
-              <a:sym typeface="Calibri"/>
-            </a:endParaRPr>
-          </a:p>
-        </p:txBody>
-      </p:sp>
-      <p:pic>
-        <p:nvPicPr>
           <p:cNvPr id="85" name="Shape 85" descr="GalaxyUserCount.png"/>
           <p:cNvPicPr preferRelativeResize="0"/>
           <p:nvPr/>
         </p:nvPicPr>
         <p:blipFill rotWithShape="1">
-          <a:blip r:embed="rId4">
+          <a:blip r:embed="rId3">
             <a:alphaModFix/>
           </a:blip>
           <a:srcRect/>
@@ -11025,7 +10939,7 @@
           <p:nvPr/>
         </p:nvPicPr>
         <p:blipFill rotWithShape="1">
-          <a:blip r:embed="rId5">
+          <a:blip r:embed="rId4">
             <a:alphaModFix/>
           </a:blip>
           <a:srcRect/>
@@ -11396,7 +11310,7 @@
           <p:nvPr/>
         </p:nvPicPr>
         <p:blipFill rotWithShape="1">
-          <a:blip r:embed="rId6">
+          <a:blip r:embed="rId5">
             <a:alphaModFix/>
           </a:blip>
           <a:srcRect/>
@@ -11465,430 +11379,6 @@
       </p:sp>
       <p:sp>
         <p:nvSpPr>
-          <p:cNvPr id="102" name="Shape 102"/>
-          <p:cNvSpPr/>
-          <p:nvPr/>
-        </p:nvSpPr>
-        <p:spPr>
-          <a:xfrm>
-            <a:off x="4572000" y="1748250"/>
-            <a:ext cx="4472100" cy="5047500"/>
-          </a:xfrm>
-          <a:prstGeom prst="rect">
-            <a:avLst/>
-          </a:prstGeom>
-          <a:noFill/>
-          <a:ln>
-            <a:noFill/>
-          </a:ln>
-        </p:spPr>
-        <p:txBody>
-          <a:bodyPr lIns="91425" tIns="45700" rIns="91425" bIns="45700" anchor="t" anchorCtr="0">
-            <a:noAutofit/>
-          </a:bodyPr>
-          <a:lstStyle/>
-          <a:p>
-            <a:pPr marL="0" marR="0" lvl="0" indent="0" algn="l" rtl="0">
-              <a:spcBef>
-                <a:spcPts val="0"/>
-              </a:spcBef>
-              <a:buSzPct val="25000"/>
-              <a:buNone/>
-            </a:pPr>
-            <a:r>
-              <a:rPr lang="en-US" sz="1800" b="1" dirty="0">
-                <a:solidFill>
-                  <a:schemeClr val="dk1"/>
-                </a:solidFill>
-                <a:latin typeface="Calibri"/>
-                <a:ea typeface="Calibri"/>
-                <a:cs typeface="Calibri"/>
-                <a:sym typeface="Calibri"/>
-              </a:rPr>
-              <a:t>RCAS</a:t>
-            </a:r>
-            <a:r>
-              <a:rPr lang="en-US" sz="1800" dirty="0">
-                <a:solidFill>
-                  <a:schemeClr val="dk1"/>
-                </a:solidFill>
-                <a:latin typeface="Calibri"/>
-                <a:ea typeface="Calibri"/>
-                <a:cs typeface="Calibri"/>
-                <a:sym typeface="Calibri"/>
-              </a:rPr>
-              <a:t> </a:t>
-            </a:r>
-          </a:p>
-          <a:p>
-            <a:pPr marL="0" marR="0" lvl="0" indent="0" algn="l" rtl="0">
-              <a:spcBef>
-                <a:spcPts val="0"/>
-              </a:spcBef>
-              <a:buSzPct val="25000"/>
-              <a:buNone/>
-            </a:pPr>
-            <a:r>
-              <a:rPr lang="en-US" sz="1800" dirty="0">
-                <a:solidFill>
-                  <a:schemeClr val="dk1"/>
-                </a:solidFill>
-                <a:latin typeface="Calibri"/>
-                <a:ea typeface="Calibri"/>
-                <a:cs typeface="Calibri"/>
-                <a:sym typeface="Calibri"/>
-              </a:rPr>
-              <a:t>RNA-centric annotation system </a:t>
-            </a:r>
-          </a:p>
-          <a:p>
-            <a:pPr marL="0" marR="0" lvl="0" indent="0" algn="l" rtl="0">
-              <a:spcBef>
-                <a:spcPts val="0"/>
-              </a:spcBef>
-              <a:buSzPct val="25000"/>
-              <a:buNone/>
-            </a:pPr>
-            <a:r>
-              <a:rPr lang="en-US" sz="1600" dirty="0">
-                <a:solidFill>
-                  <a:schemeClr val="dk1"/>
-                </a:solidFill>
-                <a:latin typeface="Calibri"/>
-                <a:ea typeface="Calibri"/>
-                <a:cs typeface="Calibri"/>
-                <a:sym typeface="Calibri"/>
-              </a:rPr>
-              <a:t>(</a:t>
-            </a:r>
-            <a:r>
-              <a:rPr lang="en-US" sz="1600" b="1" dirty="0">
-                <a:solidFill>
-                  <a:schemeClr val="dk1"/>
-                </a:solidFill>
-                <a:latin typeface="Calibri"/>
-                <a:ea typeface="Calibri"/>
-                <a:cs typeface="Calibri"/>
-                <a:sym typeface="Calibri"/>
-              </a:rPr>
-              <a:t>Manuscript</a:t>
-            </a:r>
-            <a:r>
-              <a:rPr lang="en-US" sz="1600" dirty="0">
-                <a:solidFill>
-                  <a:schemeClr val="dk1"/>
-                </a:solidFill>
-                <a:latin typeface="Calibri"/>
-                <a:ea typeface="Calibri"/>
-                <a:cs typeface="Calibri"/>
-                <a:sym typeface="Calibri"/>
-              </a:rPr>
-              <a:t> submitted)</a:t>
-            </a:r>
-          </a:p>
-          <a:p>
-            <a:pPr marL="0" marR="0" lvl="0" indent="0" algn="l" rtl="0">
-              <a:spcBef>
-                <a:spcPts val="0"/>
-              </a:spcBef>
-              <a:buNone/>
-            </a:pPr>
-            <a:endParaRPr sz="1800" b="1" dirty="0">
-              <a:solidFill>
-                <a:schemeClr val="dk1"/>
-              </a:solidFill>
-              <a:latin typeface="Calibri"/>
-              <a:ea typeface="Calibri"/>
-              <a:cs typeface="Calibri"/>
-              <a:sym typeface="Calibri"/>
-            </a:endParaRPr>
-          </a:p>
-          <a:p>
-            <a:pPr marL="0" marR="0" lvl="0" indent="0" algn="l" rtl="0">
-              <a:spcBef>
-                <a:spcPts val="0"/>
-              </a:spcBef>
-              <a:buSzPct val="25000"/>
-              <a:buNone/>
-            </a:pPr>
-            <a:r>
-              <a:rPr lang="en-US" sz="1800" b="1" dirty="0" err="1">
-                <a:solidFill>
-                  <a:schemeClr val="dk1"/>
-                </a:solidFill>
-                <a:latin typeface="Calibri"/>
-                <a:ea typeface="Calibri"/>
-                <a:cs typeface="Calibri"/>
-                <a:sym typeface="Calibri"/>
-              </a:rPr>
-              <a:t>DoRiNA</a:t>
-            </a:r>
-            <a:r>
-              <a:rPr lang="en-US" sz="1800" b="1" dirty="0">
-                <a:solidFill>
-                  <a:schemeClr val="dk1"/>
-                </a:solidFill>
-                <a:latin typeface="Calibri"/>
-                <a:ea typeface="Calibri"/>
-                <a:cs typeface="Calibri"/>
-                <a:sym typeface="Calibri"/>
-              </a:rPr>
-              <a:t> database</a:t>
-            </a:r>
-          </a:p>
-          <a:p>
-            <a:pPr marL="0" marR="0" lvl="0" indent="0" algn="l" rtl="0">
-              <a:spcBef>
-                <a:spcPts val="0"/>
-              </a:spcBef>
-              <a:buSzPct val="25000"/>
-              <a:buNone/>
-            </a:pPr>
-            <a:r>
-              <a:rPr lang="en-US" sz="1800" dirty="0">
-                <a:solidFill>
-                  <a:schemeClr val="dk1"/>
-                </a:solidFill>
-                <a:latin typeface="Calibri"/>
-                <a:ea typeface="Calibri"/>
-                <a:cs typeface="Calibri"/>
-                <a:sym typeface="Calibri"/>
-              </a:rPr>
-              <a:t>Database for binding sites of RNA-binding proteins and </a:t>
-            </a:r>
-            <a:r>
-              <a:rPr lang="en-US" sz="1800" dirty="0" err="1">
-                <a:solidFill>
-                  <a:schemeClr val="dk1"/>
-                </a:solidFill>
-                <a:latin typeface="Calibri"/>
-                <a:ea typeface="Calibri"/>
-                <a:cs typeface="Calibri"/>
-                <a:sym typeface="Calibri"/>
-              </a:rPr>
-              <a:t>miRNAs</a:t>
-            </a:r>
-            <a:endParaRPr lang="en-US" sz="1800" dirty="0">
-              <a:solidFill>
-                <a:schemeClr val="dk1"/>
-              </a:solidFill>
-              <a:latin typeface="Calibri"/>
-              <a:ea typeface="Calibri"/>
-              <a:cs typeface="Calibri"/>
-              <a:sym typeface="Calibri"/>
-            </a:endParaRPr>
-          </a:p>
-          <a:p>
-            <a:pPr marL="0" marR="0" lvl="0" indent="0" algn="l" rtl="0">
-              <a:spcBef>
-                <a:spcPts val="0"/>
-              </a:spcBef>
-              <a:buNone/>
-            </a:pPr>
-            <a:endParaRPr sz="1800" b="1" dirty="0">
-              <a:solidFill>
-                <a:schemeClr val="dk1"/>
-              </a:solidFill>
-              <a:latin typeface="Calibri"/>
-              <a:ea typeface="Calibri"/>
-              <a:cs typeface="Calibri"/>
-              <a:sym typeface="Calibri"/>
-            </a:endParaRPr>
-          </a:p>
-          <a:p>
-            <a:pPr marL="0" marR="0" lvl="0" indent="0" algn="l" rtl="0">
-              <a:spcBef>
-                <a:spcPts val="0"/>
-              </a:spcBef>
-              <a:buSzPct val="25000"/>
-              <a:buNone/>
-            </a:pPr>
-            <a:r>
-              <a:rPr lang="en-US" sz="1800" b="1" dirty="0" err="1">
-                <a:solidFill>
-                  <a:schemeClr val="dk1"/>
-                </a:solidFill>
-                <a:latin typeface="Calibri"/>
-                <a:ea typeface="Calibri"/>
-                <a:cs typeface="Calibri"/>
-                <a:sym typeface="Calibri"/>
-              </a:rPr>
-              <a:t>RiboTaper</a:t>
-            </a:r>
-            <a:endParaRPr lang="en-US" sz="1800" b="1" dirty="0">
-              <a:solidFill>
-                <a:schemeClr val="dk1"/>
-              </a:solidFill>
-              <a:latin typeface="Calibri"/>
-              <a:ea typeface="Calibri"/>
-              <a:cs typeface="Calibri"/>
-              <a:sym typeface="Calibri"/>
-            </a:endParaRPr>
-          </a:p>
-          <a:p>
-            <a:pPr marL="0" marR="0" lvl="0" indent="0" algn="l" rtl="0">
-              <a:spcBef>
-                <a:spcPts val="0"/>
-              </a:spcBef>
-              <a:buSzPct val="25000"/>
-              <a:buNone/>
-            </a:pPr>
-            <a:r>
-              <a:rPr lang="en-US" sz="1800" dirty="0">
-                <a:solidFill>
-                  <a:schemeClr val="dk1"/>
-                </a:solidFill>
-                <a:latin typeface="Calibri"/>
-                <a:ea typeface="Calibri"/>
-                <a:cs typeface="Calibri"/>
-                <a:sym typeface="Calibri"/>
-              </a:rPr>
-              <a:t>A toolbox for analysis of Ribosome profiling data</a:t>
-            </a:r>
-          </a:p>
-          <a:p>
-            <a:pPr marL="0" marR="0" lvl="0" indent="0" algn="l" rtl="0">
-              <a:spcBef>
-                <a:spcPts val="0"/>
-              </a:spcBef>
-              <a:buNone/>
-            </a:pPr>
-            <a:endParaRPr sz="1800" dirty="0">
-              <a:solidFill>
-                <a:schemeClr val="dk1"/>
-              </a:solidFill>
-              <a:latin typeface="Calibri"/>
-              <a:ea typeface="Calibri"/>
-              <a:cs typeface="Calibri"/>
-              <a:sym typeface="Calibri"/>
-            </a:endParaRPr>
-          </a:p>
-          <a:p>
-            <a:pPr marL="0" marR="0" lvl="0" indent="0" algn="l" rtl="0">
-              <a:spcBef>
-                <a:spcPts val="0"/>
-              </a:spcBef>
-              <a:buSzPct val="25000"/>
-              <a:buNone/>
-            </a:pPr>
-            <a:r>
-              <a:rPr lang="en-US" sz="1800" b="1" dirty="0" err="1">
-                <a:solidFill>
-                  <a:schemeClr val="dk1"/>
-                </a:solidFill>
-                <a:latin typeface="Calibri"/>
-                <a:ea typeface="Calibri"/>
-                <a:cs typeface="Calibri"/>
-                <a:sym typeface="Calibri"/>
-              </a:rPr>
-              <a:t>microMummie</a:t>
-            </a:r>
-            <a:endParaRPr lang="en-US" sz="1800" b="1" dirty="0">
-              <a:solidFill>
-                <a:schemeClr val="dk1"/>
-              </a:solidFill>
-              <a:latin typeface="Calibri"/>
-              <a:ea typeface="Calibri"/>
-              <a:cs typeface="Calibri"/>
-              <a:sym typeface="Calibri"/>
-            </a:endParaRPr>
-          </a:p>
-          <a:p>
-            <a:pPr marL="0" marR="0" lvl="0" indent="0" algn="l" rtl="0">
-              <a:spcBef>
-                <a:spcPts val="0"/>
-              </a:spcBef>
-              <a:buSzPct val="25000"/>
-              <a:buNone/>
-            </a:pPr>
-            <a:r>
-              <a:rPr lang="en-US" sz="1800" dirty="0">
-                <a:solidFill>
-                  <a:schemeClr val="dk1"/>
-                </a:solidFill>
-                <a:latin typeface="Calibri"/>
-                <a:ea typeface="Calibri"/>
-                <a:cs typeface="Calibri"/>
-                <a:sym typeface="Calibri"/>
-              </a:rPr>
-              <a:t>MicroRNA target site identification tool</a:t>
-            </a:r>
-          </a:p>
-          <a:p>
-            <a:pPr marL="0" marR="0" lvl="0" indent="0" algn="l" rtl="0">
-              <a:spcBef>
-                <a:spcPts val="0"/>
-              </a:spcBef>
-              <a:buNone/>
-            </a:pPr>
-            <a:endParaRPr sz="1800" dirty="0">
-              <a:solidFill>
-                <a:schemeClr val="dk1"/>
-              </a:solidFill>
-              <a:latin typeface="Calibri"/>
-              <a:ea typeface="Calibri"/>
-              <a:cs typeface="Calibri"/>
-              <a:sym typeface="Calibri"/>
-            </a:endParaRPr>
-          </a:p>
-          <a:p>
-            <a:pPr marL="0" marR="0" lvl="0" indent="0" algn="l" rtl="0">
-              <a:spcBef>
-                <a:spcPts val="0"/>
-              </a:spcBef>
-              <a:buSzPct val="25000"/>
-              <a:buNone/>
-            </a:pPr>
-            <a:r>
-              <a:rPr lang="en-US" sz="1800" b="1" dirty="0" err="1">
-                <a:solidFill>
-                  <a:schemeClr val="dk1"/>
-                </a:solidFill>
-                <a:latin typeface="Calibri"/>
-                <a:ea typeface="Calibri"/>
-                <a:cs typeface="Calibri"/>
-                <a:sym typeface="Calibri"/>
-              </a:rPr>
-              <a:t>PARalyzer</a:t>
-            </a:r>
-            <a:r>
-              <a:rPr lang="en-US" sz="1800" dirty="0">
-                <a:solidFill>
-                  <a:schemeClr val="dk1"/>
-                </a:solidFill>
-                <a:latin typeface="Calibri"/>
-                <a:ea typeface="Calibri"/>
-                <a:cs typeface="Calibri"/>
-                <a:sym typeface="Calibri"/>
-              </a:rPr>
-              <a:t> </a:t>
-            </a:r>
-          </a:p>
-          <a:p>
-            <a:pPr marL="0" marR="0" lvl="0" indent="0" algn="l" rtl="0">
-              <a:spcBef>
-                <a:spcPts val="0"/>
-              </a:spcBef>
-              <a:buSzPct val="25000"/>
-              <a:buNone/>
-            </a:pPr>
-            <a:r>
-              <a:rPr lang="en-US" sz="1800" dirty="0">
-                <a:solidFill>
-                  <a:schemeClr val="dk1"/>
-                </a:solidFill>
-                <a:latin typeface="Calibri"/>
-                <a:ea typeface="Calibri"/>
-                <a:cs typeface="Calibri"/>
-                <a:sym typeface="Calibri"/>
-              </a:rPr>
-              <a:t>RNA binding site detection from PAR-CLIP datasets</a:t>
-            </a:r>
-          </a:p>
-        </p:txBody>
-      </p:sp>
-      <p:sp>
-        <p:nvSpPr>
           <p:cNvPr id="103" name="Shape 103"/>
           <p:cNvSpPr txBox="1"/>
           <p:nvPr/>
@@ -12253,7 +11743,7 @@
           <p:nvPr/>
         </p:nvPicPr>
         <p:blipFill>
-          <a:blip r:embed="rId7">
+          <a:blip r:embed="rId6">
             <a:alphaModFix/>
           </a:blip>
           <a:stretch>
@@ -12281,7 +11771,7 @@
           <p:nvPr/>
         </p:nvPicPr>
         <p:blipFill>
-          <a:blip r:embed="rId8">
+          <a:blip r:embed="rId7">
             <a:alphaModFix/>
           </a:blip>
           <a:stretch>
@@ -12309,7 +11799,7 @@
           <p:nvPr/>
         </p:nvPicPr>
         <p:blipFill>
-          <a:blip r:embed="rId9">
+          <a:blip r:embed="rId8">
             <a:alphaModFix/>
           </a:blip>
           <a:stretch>
@@ -12337,7 +11827,7 @@
           <p:nvPr/>
         </p:nvPicPr>
         <p:blipFill>
-          <a:blip r:embed="rId10">
+          <a:blip r:embed="rId9">
             <a:alphaModFix/>
           </a:blip>
           <a:stretch>
@@ -12365,7 +11855,7 @@
           <p:nvPr/>
         </p:nvPicPr>
         <p:blipFill>
-          <a:blip r:embed="rId7">
+          <a:blip r:embed="rId6">
             <a:alphaModFix/>
           </a:blip>
           <a:stretch>
@@ -12393,7 +11883,7 @@
           <p:nvPr/>
         </p:nvPicPr>
         <p:blipFill>
-          <a:blip r:embed="rId10">
+          <a:blip r:embed="rId9">
             <a:alphaModFix/>
           </a:blip>
           <a:stretch>
@@ -12421,7 +11911,7 @@
           <p:nvPr/>
         </p:nvPicPr>
         <p:blipFill>
-          <a:blip r:embed="rId11">
+          <a:blip r:embed="rId10">
             <a:alphaModFix/>
           </a:blip>
           <a:stretch>
@@ -12449,7 +11939,7 @@
           <p:nvPr/>
         </p:nvPicPr>
         <p:blipFill>
-          <a:blip r:embed="rId11">
+          <a:blip r:embed="rId10">
             <a:alphaModFix/>
           </a:blip>
           <a:stretch>
@@ -12477,7 +11967,7 @@
           <p:nvPr/>
         </p:nvPicPr>
         <p:blipFill>
-          <a:blip r:embed="rId12">
+          <a:blip r:embed="rId11">
             <a:alphaModFix/>
           </a:blip>
           <a:stretch>
@@ -12507,7 +11997,7 @@
           <p:nvPr/>
         </p:nvPicPr>
         <p:blipFill>
-          <a:blip r:embed="rId13">
+          <a:blip r:embed="rId12">
             <a:extLst>
               <a:ext uri="{28A0092B-C50C-407E-A947-70E740481C1C}">
                 <a14:useLocalDpi xmlns:a14="http://schemas.microsoft.com/office/drawing/2010/main" val="0"/>
@@ -12537,7 +12027,7 @@
           <p:nvPr/>
         </p:nvPicPr>
         <p:blipFill>
-          <a:blip r:embed="rId13">
+          <a:blip r:embed="rId12">
             <a:extLst>
               <a:ext uri="{28A0092B-C50C-407E-A947-70E740481C1C}">
                 <a14:useLocalDpi xmlns:a14="http://schemas.microsoft.com/office/drawing/2010/main" val="0"/>
@@ -12560,19 +12050,13 @@
       </p:pic>
       <p:pic>
         <p:nvPicPr>
-          <p:cNvPr id="4" name="Bild 3" descr="Perllogo.png"/>
-          <p:cNvPicPr>
-            <a:picLocks noChangeAspect="1"/>
-          </p:cNvPicPr>
+          <p:cNvPr id="38" name="Shape 108"/>
+          <p:cNvPicPr preferRelativeResize="0"/>
           <p:nvPr/>
         </p:nvPicPr>
         <p:blipFill>
-          <a:blip r:embed="rId14">
-            <a:extLst>
-              <a:ext uri="{28A0092B-C50C-407E-A947-70E740481C1C}">
-                <a14:useLocalDpi xmlns:a14="http://schemas.microsoft.com/office/drawing/2010/main" val="0"/>
-              </a:ext>
-            </a:extLst>
+          <a:blip r:embed="rId9">
+            <a:alphaModFix/>
           </a:blip>
           <a:stretch>
             <a:fillRect/>
@@ -12580,49 +12064,510 @@
         </p:blipFill>
         <p:spPr>
           <a:xfrm>
-            <a:off x="6148651" y="4982792"/>
-            <a:ext cx="779926" cy="391182"/>
+            <a:off x="6977536" y="2858341"/>
+            <a:ext cx="711200" cy="196260"/>
           </a:xfrm>
           <a:prstGeom prst="rect">
             <a:avLst/>
           </a:prstGeom>
+          <a:noFill/>
+          <a:ln>
+            <a:noFill/>
+          </a:ln>
         </p:spPr>
       </p:pic>
-      <p:pic>
-        <p:nvPicPr>
-          <p:cNvPr id="6" name="Bild 5" descr="python-logo-master.png"/>
-          <p:cNvPicPr>
-            <a:picLocks noChangeAspect="1"/>
-          </p:cNvPicPr>
+      <p:sp>
+        <p:nvSpPr>
+          <p:cNvPr id="84" name="Shape 84"/>
+          <p:cNvSpPr/>
           <p:nvPr/>
-        </p:nvPicPr>
-        <p:blipFill>
-          <a:blip r:embed="rId15">
-            <a:extLst>
-              <a:ext uri="{28A0092B-C50C-407E-A947-70E740481C1C}">
-                <a14:useLocalDpi xmlns:a14="http://schemas.microsoft.com/office/drawing/2010/main" val="0"/>
-              </a:ext>
-            </a:extLst>
-          </a:blip>
-          <a:stretch>
-            <a:fillRect/>
-          </a:stretch>
-        </p:blipFill>
+        </p:nvSpPr>
         <p:spPr>
           <a:xfrm>
-            <a:off x="6908889" y="2785948"/>
-            <a:ext cx="843007" cy="365662"/>
+            <a:off x="60065" y="1619675"/>
+            <a:ext cx="8984100" cy="5176200"/>
           </a:xfrm>
           <a:prstGeom prst="rect">
             <a:avLst/>
           </a:prstGeom>
+          <a:noFill/>
+          <a:ln w="38100" cap="flat" cmpd="sng">
+            <a:solidFill>
+              <a:schemeClr val="dk1"/>
+            </a:solidFill>
+            <a:prstDash val="solid"/>
+            <a:round/>
+            <a:headEnd type="none" w="med" len="med"/>
+            <a:tailEnd type="none" w="med" len="med"/>
+          </a:ln>
+          <a:effectLst>
+            <a:outerShdw blurRad="39999" dist="23000" dir="5400000" rotWithShape="0">
+              <a:srgbClr val="000000">
+                <a:alpha val="34900"/>
+              </a:srgbClr>
+            </a:outerShdw>
+          </a:effectLst>
         </p:spPr>
-      </p:pic>
+        <p:txBody>
+          <a:bodyPr lIns="91425" tIns="45700" rIns="91425" bIns="45700" anchor="ctr" anchorCtr="0">
+            <a:noAutofit/>
+          </a:bodyPr>
+          <a:lstStyle/>
+          <a:p>
+            <a:pPr marL="0" marR="0" lvl="0" indent="0" algn="ctr" rtl="0">
+              <a:spcBef>
+                <a:spcPts val="0"/>
+              </a:spcBef>
+              <a:buNone/>
+            </a:pPr>
+            <a:endParaRPr sz="1800">
+              <a:solidFill>
+                <a:schemeClr val="lt1"/>
+              </a:solidFill>
+              <a:latin typeface="Calibri"/>
+              <a:ea typeface="Calibri"/>
+              <a:cs typeface="Calibri"/>
+              <a:sym typeface="Calibri"/>
+            </a:endParaRPr>
+          </a:p>
+        </p:txBody>
+      </p:sp>
+      <p:sp>
+        <p:nvSpPr>
+          <p:cNvPr id="102" name="Shape 102"/>
+          <p:cNvSpPr/>
+          <p:nvPr/>
+        </p:nvSpPr>
+        <p:spPr>
+          <a:xfrm>
+            <a:off x="4572000" y="1748250"/>
+            <a:ext cx="4472100" cy="5047500"/>
+          </a:xfrm>
+          <a:prstGeom prst="rect">
+            <a:avLst/>
+          </a:prstGeom>
+          <a:noFill/>
+          <a:ln>
+            <a:noFill/>
+          </a:ln>
+        </p:spPr>
+        <p:txBody>
+          <a:bodyPr lIns="91425" tIns="45700" rIns="91425" bIns="45700" anchor="t" anchorCtr="0">
+            <a:noAutofit/>
+          </a:bodyPr>
+          <a:lstStyle/>
+          <a:p>
+            <a:pPr marL="0" marR="0" lvl="0" indent="0" algn="l" rtl="0">
+              <a:spcBef>
+                <a:spcPts val="0"/>
+              </a:spcBef>
+              <a:buSzPct val="25000"/>
+              <a:buNone/>
+            </a:pPr>
+            <a:r>
+              <a:rPr lang="en-US" sz="1800" b="1" dirty="0">
+                <a:solidFill>
+                  <a:schemeClr val="dk1"/>
+                </a:solidFill>
+                <a:latin typeface="Calibri"/>
+                <a:ea typeface="Calibri"/>
+                <a:cs typeface="Calibri"/>
+                <a:sym typeface="Calibri"/>
+              </a:rPr>
+              <a:t>RCAS</a:t>
+            </a:r>
+            <a:r>
+              <a:rPr lang="en-US" sz="1800" dirty="0">
+                <a:solidFill>
+                  <a:schemeClr val="dk1"/>
+                </a:solidFill>
+                <a:latin typeface="Calibri"/>
+                <a:ea typeface="Calibri"/>
+                <a:cs typeface="Calibri"/>
+                <a:sym typeface="Calibri"/>
+              </a:rPr>
+              <a:t> </a:t>
+            </a:r>
+          </a:p>
+          <a:p>
+            <a:pPr marL="0" marR="0" lvl="0" indent="0" algn="l" rtl="0">
+              <a:spcBef>
+                <a:spcPts val="0"/>
+              </a:spcBef>
+              <a:buSzPct val="25000"/>
+              <a:buNone/>
+            </a:pPr>
+            <a:r>
+              <a:rPr lang="en-US" sz="1800" dirty="0">
+                <a:solidFill>
+                  <a:schemeClr val="dk1"/>
+                </a:solidFill>
+                <a:latin typeface="Calibri"/>
+                <a:ea typeface="Calibri"/>
+                <a:cs typeface="Calibri"/>
+                <a:sym typeface="Calibri"/>
+              </a:rPr>
+              <a:t>RNA-centric annotation system </a:t>
+            </a:r>
+          </a:p>
+          <a:p>
+            <a:pPr marL="0" marR="0" lvl="0" indent="0" algn="l" rtl="0">
+              <a:spcBef>
+                <a:spcPts val="0"/>
+              </a:spcBef>
+              <a:buSzPct val="25000"/>
+              <a:buNone/>
+            </a:pPr>
+            <a:r>
+              <a:rPr lang="en-US" sz="1600" dirty="0">
+                <a:solidFill>
+                  <a:schemeClr val="dk1"/>
+                </a:solidFill>
+                <a:latin typeface="Calibri"/>
+                <a:ea typeface="Calibri"/>
+                <a:cs typeface="Calibri"/>
+                <a:sym typeface="Calibri"/>
+              </a:rPr>
+              <a:t>(</a:t>
+            </a:r>
+            <a:r>
+              <a:rPr lang="en-US" sz="1600" b="1" dirty="0">
+                <a:solidFill>
+                  <a:schemeClr val="dk1"/>
+                </a:solidFill>
+                <a:latin typeface="Calibri"/>
+                <a:ea typeface="Calibri"/>
+                <a:cs typeface="Calibri"/>
+                <a:sym typeface="Calibri"/>
+              </a:rPr>
+              <a:t>Manuscript</a:t>
+            </a:r>
+            <a:r>
+              <a:rPr lang="en-US" sz="1600" dirty="0">
+                <a:solidFill>
+                  <a:schemeClr val="dk1"/>
+                </a:solidFill>
+                <a:latin typeface="Calibri"/>
+                <a:ea typeface="Calibri"/>
+                <a:cs typeface="Calibri"/>
+                <a:sym typeface="Calibri"/>
+              </a:rPr>
+              <a:t> submitted)</a:t>
+            </a:r>
+          </a:p>
+          <a:p>
+            <a:pPr marL="0" marR="0" lvl="0" indent="0" algn="l" rtl="0">
+              <a:spcBef>
+                <a:spcPts val="0"/>
+              </a:spcBef>
+              <a:buNone/>
+            </a:pPr>
+            <a:endParaRPr sz="1800" b="1" dirty="0">
+              <a:solidFill>
+                <a:schemeClr val="dk1"/>
+              </a:solidFill>
+              <a:latin typeface="Calibri"/>
+              <a:ea typeface="Calibri"/>
+              <a:cs typeface="Calibri"/>
+              <a:sym typeface="Calibri"/>
+            </a:endParaRPr>
+          </a:p>
+          <a:p>
+            <a:pPr marL="0" marR="0" lvl="0" indent="0" algn="l" rtl="0">
+              <a:spcBef>
+                <a:spcPts val="0"/>
+              </a:spcBef>
+              <a:buSzPct val="25000"/>
+              <a:buNone/>
+            </a:pPr>
+            <a:r>
+              <a:rPr lang="en-US" sz="1800" b="1" dirty="0" err="1">
+                <a:solidFill>
+                  <a:schemeClr val="dk1"/>
+                </a:solidFill>
+                <a:latin typeface="Calibri"/>
+                <a:ea typeface="Calibri"/>
+                <a:cs typeface="Calibri"/>
+                <a:sym typeface="Calibri"/>
+              </a:rPr>
+              <a:t>DoRiNA</a:t>
+            </a:r>
+            <a:r>
+              <a:rPr lang="en-US" sz="1800" b="1" dirty="0">
+                <a:solidFill>
+                  <a:schemeClr val="dk1"/>
+                </a:solidFill>
+                <a:latin typeface="Calibri"/>
+                <a:ea typeface="Calibri"/>
+                <a:cs typeface="Calibri"/>
+                <a:sym typeface="Calibri"/>
+              </a:rPr>
+              <a:t> database</a:t>
+            </a:r>
+          </a:p>
+          <a:p>
+            <a:pPr marL="0" marR="0" lvl="0" indent="0" algn="l" rtl="0">
+              <a:spcBef>
+                <a:spcPts val="0"/>
+              </a:spcBef>
+              <a:buSzPct val="25000"/>
+              <a:buNone/>
+            </a:pPr>
+            <a:r>
+              <a:rPr lang="en-US" sz="1800" dirty="0">
+                <a:solidFill>
+                  <a:schemeClr val="dk1"/>
+                </a:solidFill>
+                <a:latin typeface="Calibri"/>
+                <a:ea typeface="Calibri"/>
+                <a:cs typeface="Calibri"/>
+                <a:sym typeface="Calibri"/>
+              </a:rPr>
+              <a:t>Database for binding sites of RNA-binding proteins and </a:t>
+            </a:r>
+            <a:r>
+              <a:rPr lang="en-US" sz="1800" dirty="0" err="1">
+                <a:solidFill>
+                  <a:schemeClr val="dk1"/>
+                </a:solidFill>
+                <a:latin typeface="Calibri"/>
+                <a:ea typeface="Calibri"/>
+                <a:cs typeface="Calibri"/>
+                <a:sym typeface="Calibri"/>
+              </a:rPr>
+              <a:t>miRNAs</a:t>
+            </a:r>
+            <a:endParaRPr lang="en-US" sz="1800" dirty="0">
+              <a:solidFill>
+                <a:schemeClr val="dk1"/>
+              </a:solidFill>
+              <a:latin typeface="Calibri"/>
+              <a:ea typeface="Calibri"/>
+              <a:cs typeface="Calibri"/>
+              <a:sym typeface="Calibri"/>
+            </a:endParaRPr>
+          </a:p>
+          <a:p>
+            <a:pPr marL="0" marR="0" lvl="0" indent="0" algn="l" rtl="0">
+              <a:spcBef>
+                <a:spcPts val="0"/>
+              </a:spcBef>
+              <a:buNone/>
+            </a:pPr>
+            <a:endParaRPr sz="1800" b="1" dirty="0">
+              <a:solidFill>
+                <a:schemeClr val="dk1"/>
+              </a:solidFill>
+              <a:latin typeface="Calibri"/>
+              <a:ea typeface="Calibri"/>
+              <a:cs typeface="Calibri"/>
+              <a:sym typeface="Calibri"/>
+            </a:endParaRPr>
+          </a:p>
+          <a:p>
+            <a:pPr marL="0" marR="0" lvl="0" indent="0" algn="l" rtl="0">
+              <a:spcBef>
+                <a:spcPts val="0"/>
+              </a:spcBef>
+              <a:buSzPct val="25000"/>
+              <a:buNone/>
+            </a:pPr>
+            <a:r>
+              <a:rPr lang="en-US" sz="1800" b="1" dirty="0" err="1">
+                <a:solidFill>
+                  <a:schemeClr val="dk1"/>
+                </a:solidFill>
+                <a:latin typeface="Calibri"/>
+                <a:ea typeface="Calibri"/>
+                <a:cs typeface="Calibri"/>
+                <a:sym typeface="Calibri"/>
+              </a:rPr>
+              <a:t>RiboTaper</a:t>
+            </a:r>
+            <a:endParaRPr lang="en-US" sz="1800" b="1" dirty="0">
+              <a:solidFill>
+                <a:schemeClr val="dk1"/>
+              </a:solidFill>
+              <a:latin typeface="Calibri"/>
+              <a:ea typeface="Calibri"/>
+              <a:cs typeface="Calibri"/>
+              <a:sym typeface="Calibri"/>
+            </a:endParaRPr>
+          </a:p>
+          <a:p>
+            <a:pPr marL="0" marR="0" lvl="0" indent="0" algn="l" rtl="0">
+              <a:spcBef>
+                <a:spcPts val="0"/>
+              </a:spcBef>
+              <a:buSzPct val="25000"/>
+              <a:buNone/>
+            </a:pPr>
+            <a:r>
+              <a:rPr lang="en-US" sz="1800" dirty="0">
+                <a:solidFill>
+                  <a:schemeClr val="dk1"/>
+                </a:solidFill>
+                <a:latin typeface="Calibri"/>
+                <a:ea typeface="Calibri"/>
+                <a:cs typeface="Calibri"/>
+                <a:sym typeface="Calibri"/>
+              </a:rPr>
+              <a:t>A toolbox for analysis of Ribosome profiling data</a:t>
+            </a:r>
+          </a:p>
+          <a:p>
+            <a:pPr marL="0" marR="0" lvl="0" indent="0" algn="l" rtl="0">
+              <a:spcBef>
+                <a:spcPts val="0"/>
+              </a:spcBef>
+              <a:buNone/>
+            </a:pPr>
+            <a:endParaRPr sz="1800" dirty="0">
+              <a:solidFill>
+                <a:schemeClr val="dk1"/>
+              </a:solidFill>
+              <a:latin typeface="Calibri"/>
+              <a:ea typeface="Calibri"/>
+              <a:cs typeface="Calibri"/>
+              <a:sym typeface="Calibri"/>
+            </a:endParaRPr>
+          </a:p>
+          <a:p>
+            <a:pPr marL="0" marR="0" lvl="0" indent="0" algn="l" rtl="0">
+              <a:spcBef>
+                <a:spcPts val="0"/>
+              </a:spcBef>
+              <a:buSzPct val="25000"/>
+              <a:buNone/>
+            </a:pPr>
+            <a:r>
+              <a:rPr lang="en-US" sz="1800" b="1" dirty="0" err="1">
+                <a:solidFill>
+                  <a:schemeClr val="dk1"/>
+                </a:solidFill>
+                <a:latin typeface="Calibri"/>
+                <a:ea typeface="Calibri"/>
+                <a:cs typeface="Calibri"/>
+                <a:sym typeface="Calibri"/>
+              </a:rPr>
+              <a:t>microMummie</a:t>
+            </a:r>
+            <a:endParaRPr lang="en-US" sz="1800" b="1" dirty="0">
+              <a:solidFill>
+                <a:schemeClr val="dk1"/>
+              </a:solidFill>
+              <a:latin typeface="Calibri"/>
+              <a:ea typeface="Calibri"/>
+              <a:cs typeface="Calibri"/>
+              <a:sym typeface="Calibri"/>
+            </a:endParaRPr>
+          </a:p>
+          <a:p>
+            <a:pPr marL="0" marR="0" lvl="0" indent="0" algn="l" rtl="0">
+              <a:spcBef>
+                <a:spcPts val="0"/>
+              </a:spcBef>
+              <a:buSzPct val="25000"/>
+              <a:buNone/>
+            </a:pPr>
+            <a:r>
+              <a:rPr lang="en-US" sz="1800" dirty="0">
+                <a:solidFill>
+                  <a:schemeClr val="dk1"/>
+                </a:solidFill>
+                <a:latin typeface="Calibri"/>
+                <a:ea typeface="Calibri"/>
+                <a:cs typeface="Calibri"/>
+                <a:sym typeface="Calibri"/>
+              </a:rPr>
+              <a:t>MicroRNA target site identification tool</a:t>
+            </a:r>
+          </a:p>
+          <a:p>
+            <a:pPr marL="0" marR="0" lvl="0" indent="0" algn="l" rtl="0">
+              <a:spcBef>
+                <a:spcPts val="0"/>
+              </a:spcBef>
+              <a:buNone/>
+            </a:pPr>
+            <a:endParaRPr sz="1800" dirty="0">
+              <a:solidFill>
+                <a:schemeClr val="dk1"/>
+              </a:solidFill>
+              <a:latin typeface="Calibri"/>
+              <a:ea typeface="Calibri"/>
+              <a:cs typeface="Calibri"/>
+              <a:sym typeface="Calibri"/>
+            </a:endParaRPr>
+          </a:p>
+          <a:p>
+            <a:pPr marL="0" marR="0" lvl="0" indent="0" algn="l" rtl="0">
+              <a:spcBef>
+                <a:spcPts val="0"/>
+              </a:spcBef>
+              <a:buSzPct val="25000"/>
+              <a:buNone/>
+            </a:pPr>
+            <a:r>
+              <a:rPr lang="en-US" sz="1800" b="1" dirty="0" err="1">
+                <a:solidFill>
+                  <a:schemeClr val="dk1"/>
+                </a:solidFill>
+                <a:latin typeface="Calibri"/>
+                <a:ea typeface="Calibri"/>
+                <a:cs typeface="Calibri"/>
+                <a:sym typeface="Calibri"/>
+              </a:rPr>
+              <a:t>PARalyzer</a:t>
+            </a:r>
+            <a:r>
+              <a:rPr lang="en-US" sz="1800" dirty="0">
+                <a:solidFill>
+                  <a:schemeClr val="dk1"/>
+                </a:solidFill>
+                <a:latin typeface="Calibri"/>
+                <a:ea typeface="Calibri"/>
+                <a:cs typeface="Calibri"/>
+                <a:sym typeface="Calibri"/>
+              </a:rPr>
+              <a:t> </a:t>
+            </a:r>
+          </a:p>
+          <a:p>
+            <a:pPr marL="0" marR="0" lvl="0" indent="0" algn="l" rtl="0">
+              <a:spcBef>
+                <a:spcPts val="0"/>
+              </a:spcBef>
+              <a:buSzPct val="25000"/>
+              <a:buNone/>
+            </a:pPr>
+            <a:r>
+              <a:rPr lang="en-US" sz="1800" dirty="0">
+                <a:solidFill>
+                  <a:schemeClr val="dk1"/>
+                </a:solidFill>
+                <a:latin typeface="Calibri"/>
+                <a:ea typeface="Calibri"/>
+                <a:cs typeface="Calibri"/>
+                <a:sym typeface="Calibri"/>
+              </a:rPr>
+              <a:t>RNA binding site detection from PAR-CLIP datasets</a:t>
+            </a:r>
+          </a:p>
+        </p:txBody>
+      </p:sp>
     </p:spTree>
   </p:cSld>
   <p:clrMapOvr>
     <a:masterClrMapping/>
   </p:clrMapOvr>
+  <p:timing>
+    <p:tnLst>
+      <p:par>
+        <p:cTn xmlns:p14="http://schemas.microsoft.com/office/powerpoint/2010/main" id="1" dur="indefinite" restart="never" nodeType="tmRoot"/>
+      </p:par>
+    </p:tnLst>
+  </p:timing>
 </p:sld>
 </file>
 

</xml_diff>

<commit_message>
removed RCAS manuscript line
</commit_message>
<xml_diff>
--- a/rbc_bimsb/sab-berlin-2016/slide_for_Rolfs_talk.pptx
+++ b/rbc_bimsb/sab-berlin-2016/slide_for_Rolfs_talk.pptx
@@ -12219,9 +12219,9 @@
               <a:buNone/>
             </a:pPr>
             <a:r>
-              <a:rPr lang="en-US" sz="1600" dirty="0">
-                <a:solidFill>
-                  <a:schemeClr val="dk1"/>
+              <a:rPr lang="en-US" sz="1600" dirty="0" smtClean="0">
+                <a:solidFill>
+                  <a:schemeClr val="bg1"/>
                 </a:solidFill>
                 <a:latin typeface="Calibri"/>
                 <a:ea typeface="Calibri"/>
@@ -12231,9 +12231,9 @@
               <a:t>(</a:t>
             </a:r>
             <a:r>
-              <a:rPr lang="en-US" sz="1600" b="1" dirty="0">
-                <a:solidFill>
-                  <a:schemeClr val="dk1"/>
+              <a:rPr lang="en-US" sz="1600" b="1" dirty="0" smtClean="0">
+                <a:solidFill>
+                  <a:schemeClr val="bg1"/>
                 </a:solidFill>
                 <a:latin typeface="Calibri"/>
                 <a:ea typeface="Calibri"/>
@@ -12243,9 +12243,9 @@
               <a:t>Manuscript</a:t>
             </a:r>
             <a:r>
-              <a:rPr lang="en-US" sz="1600" dirty="0">
-                <a:solidFill>
-                  <a:schemeClr val="dk1"/>
+              <a:rPr lang="en-US" sz="1600" dirty="0" smtClean="0">
+                <a:solidFill>
+                  <a:schemeClr val="bg1"/>
                 </a:solidFill>
                 <a:latin typeface="Calibri"/>
                 <a:ea typeface="Calibri"/>

</xml_diff>